<commit_message>
Fixes on Hungarian slides
</commit_message>
<xml_diff>
--- a/slides/hun/EDITED VERSION A 2018-2019-es választásokról dióhéjban.pptx
+++ b/slides/hun/EDITED VERSION A 2018-2019-es választásokról dióhéjban.pptx
@@ -1617,7 +1617,7 @@
   <p:cSld>
     <p:spTree>
       <p:nvGrpSpPr>
-        <p:cNvPr id="204" name="Shape 204"/>
+        <p:cNvPr id="202" name="Shape 202"/>
         <p:cNvGrpSpPr/>
         <p:nvPr/>
       </p:nvGrpSpPr>
@@ -1631,7 +1631,7 @@
       </p:grpSpPr>
       <p:sp>
         <p:nvSpPr>
-          <p:cNvPr id="205" name="Google Shape;205;p16:notes"/>
+          <p:cNvPr id="203" name="Google Shape;203;p16:notes"/>
           <p:cNvSpPr txBox="1"/>
           <p:nvPr>
             <p:ph idx="1" type="body"/>
@@ -1670,7 +1670,7 @@
       </p:sp>
       <p:sp>
         <p:nvSpPr>
-          <p:cNvPr id="206" name="Google Shape;206;p16:notes"/>
+          <p:cNvPr id="204" name="Google Shape;204;p16:notes"/>
           <p:cNvSpPr/>
           <p:nvPr>
             <p:ph idx="2" type="sldImg"/>
@@ -1716,7 +1716,7 @@
   <p:cSld>
     <p:spTree>
       <p:nvGrpSpPr>
-        <p:cNvPr id="217" name="Shape 217"/>
+        <p:cNvPr id="215" name="Shape 215"/>
         <p:cNvGrpSpPr/>
         <p:nvPr/>
       </p:nvGrpSpPr>
@@ -1730,7 +1730,7 @@
       </p:grpSpPr>
       <p:sp>
         <p:nvSpPr>
-          <p:cNvPr id="218" name="Google Shape;218;p17:notes"/>
+          <p:cNvPr id="216" name="Google Shape;216;p17:notes"/>
           <p:cNvSpPr txBox="1"/>
           <p:nvPr>
             <p:ph idx="1" type="body"/>
@@ -1769,7 +1769,7 @@
       </p:sp>
       <p:sp>
         <p:nvSpPr>
-          <p:cNvPr id="219" name="Google Shape;219;p17:notes"/>
+          <p:cNvPr id="217" name="Google Shape;217;p17:notes"/>
           <p:cNvSpPr/>
           <p:nvPr>
             <p:ph idx="2" type="sldImg"/>
@@ -1914,7 +1914,7 @@
   <p:cSld>
     <p:spTree>
       <p:nvGrpSpPr>
-        <p:cNvPr id="233" name="Shape 233"/>
+        <p:cNvPr id="229" name="Shape 229"/>
         <p:cNvGrpSpPr/>
         <p:nvPr/>
       </p:nvGrpSpPr>
@@ -1928,7 +1928,7 @@
       </p:grpSpPr>
       <p:sp>
         <p:nvSpPr>
-          <p:cNvPr id="234" name="Google Shape;234;p18:notes"/>
+          <p:cNvPr id="230" name="Google Shape;230;p18:notes"/>
           <p:cNvSpPr txBox="1"/>
           <p:nvPr>
             <p:ph idx="1" type="body"/>
@@ -1967,7 +1967,7 @@
       </p:sp>
       <p:sp>
         <p:nvSpPr>
-          <p:cNvPr id="235" name="Google Shape;235;p18:notes"/>
+          <p:cNvPr id="231" name="Google Shape;231;p18:notes"/>
           <p:cNvSpPr/>
           <p:nvPr>
             <p:ph idx="2" type="sldImg"/>
@@ -2013,7 +2013,7 @@
   <p:cSld>
     <p:spTree>
       <p:nvGrpSpPr>
-        <p:cNvPr id="244" name="Shape 244"/>
+        <p:cNvPr id="240" name="Shape 240"/>
         <p:cNvGrpSpPr/>
         <p:nvPr/>
       </p:nvGrpSpPr>
@@ -2027,7 +2027,7 @@
       </p:grpSpPr>
       <p:sp>
         <p:nvSpPr>
-          <p:cNvPr id="245" name="Google Shape;245;p19:notes"/>
+          <p:cNvPr id="241" name="Google Shape;241;p19:notes"/>
           <p:cNvSpPr txBox="1"/>
           <p:nvPr>
             <p:ph idx="1" type="body"/>
@@ -2066,7 +2066,7 @@
       </p:sp>
       <p:sp>
         <p:nvSpPr>
-          <p:cNvPr id="246" name="Google Shape;246;p19:notes"/>
+          <p:cNvPr id="242" name="Google Shape;242;p19:notes"/>
           <p:cNvSpPr/>
           <p:nvPr>
             <p:ph idx="2" type="sldImg"/>
@@ -2112,7 +2112,7 @@
   <p:cSld>
     <p:spTree>
       <p:nvGrpSpPr>
-        <p:cNvPr id="256" name="Shape 256"/>
+        <p:cNvPr id="252" name="Shape 252"/>
         <p:cNvGrpSpPr/>
         <p:nvPr/>
       </p:nvGrpSpPr>
@@ -2126,7 +2126,7 @@
       </p:grpSpPr>
       <p:sp>
         <p:nvSpPr>
-          <p:cNvPr id="257" name="Google Shape;257;p20:notes"/>
+          <p:cNvPr id="253" name="Google Shape;253;p20:notes"/>
           <p:cNvSpPr txBox="1"/>
           <p:nvPr>
             <p:ph idx="1" type="body"/>
@@ -2165,7 +2165,7 @@
       </p:sp>
       <p:sp>
         <p:nvSpPr>
-          <p:cNvPr id="258" name="Google Shape;258;p20:notes"/>
+          <p:cNvPr id="254" name="Google Shape;254;p20:notes"/>
           <p:cNvSpPr/>
           <p:nvPr>
             <p:ph idx="2" type="sldImg"/>
@@ -2211,7 +2211,7 @@
   <p:cSld>
     <p:spTree>
       <p:nvGrpSpPr>
-        <p:cNvPr id="268" name="Shape 268"/>
+        <p:cNvPr id="264" name="Shape 264"/>
         <p:cNvGrpSpPr/>
         <p:nvPr/>
       </p:nvGrpSpPr>
@@ -2225,7 +2225,7 @@
       </p:grpSpPr>
       <p:sp>
         <p:nvSpPr>
-          <p:cNvPr id="269" name="Google Shape;269;p21:notes"/>
+          <p:cNvPr id="265" name="Google Shape;265;p21:notes"/>
           <p:cNvSpPr txBox="1"/>
           <p:nvPr>
             <p:ph idx="1" type="body"/>
@@ -2264,7 +2264,7 @@
       </p:sp>
       <p:sp>
         <p:nvSpPr>
-          <p:cNvPr id="270" name="Google Shape;270;p21:notes"/>
+          <p:cNvPr id="266" name="Google Shape;266;p21:notes"/>
           <p:cNvSpPr/>
           <p:nvPr>
             <p:ph idx="2" type="sldImg"/>
@@ -2310,7 +2310,7 @@
   <p:cSld>
     <p:spTree>
       <p:nvGrpSpPr>
-        <p:cNvPr id="281" name="Shape 281"/>
+        <p:cNvPr id="277" name="Shape 277"/>
         <p:cNvGrpSpPr/>
         <p:nvPr/>
       </p:nvGrpSpPr>
@@ -2324,7 +2324,7 @@
       </p:grpSpPr>
       <p:sp>
         <p:nvSpPr>
-          <p:cNvPr id="282" name="Google Shape;282;p22:notes"/>
+          <p:cNvPr id="278" name="Google Shape;278;p22:notes"/>
           <p:cNvSpPr txBox="1"/>
           <p:nvPr>
             <p:ph idx="1" type="body"/>
@@ -2363,7 +2363,7 @@
       </p:sp>
       <p:sp>
         <p:nvSpPr>
-          <p:cNvPr id="283" name="Google Shape;283;p22:notes"/>
+          <p:cNvPr id="279" name="Google Shape;279;p22:notes"/>
           <p:cNvSpPr/>
           <p:nvPr>
             <p:ph idx="2" type="sldImg"/>
@@ -2409,7 +2409,7 @@
   <p:cSld>
     <p:spTree>
       <p:nvGrpSpPr>
-        <p:cNvPr id="296" name="Shape 296"/>
+        <p:cNvPr id="290" name="Shape 290"/>
         <p:cNvGrpSpPr/>
         <p:nvPr/>
       </p:nvGrpSpPr>
@@ -2423,7 +2423,7 @@
       </p:grpSpPr>
       <p:sp>
         <p:nvSpPr>
-          <p:cNvPr id="297" name="Google Shape;297;p23:notes"/>
+          <p:cNvPr id="291" name="Google Shape;291;p23:notes"/>
           <p:cNvSpPr txBox="1"/>
           <p:nvPr>
             <p:ph idx="1" type="body"/>
@@ -2462,7 +2462,7 @@
       </p:sp>
       <p:sp>
         <p:nvSpPr>
-          <p:cNvPr id="298" name="Google Shape;298;p23:notes"/>
+          <p:cNvPr id="292" name="Google Shape;292;p23:notes"/>
           <p:cNvSpPr/>
           <p:nvPr>
             <p:ph idx="2" type="sldImg"/>
@@ -2508,7 +2508,7 @@
   <p:cSld>
     <p:spTree>
       <p:nvGrpSpPr>
-        <p:cNvPr id="310" name="Shape 310"/>
+        <p:cNvPr id="304" name="Shape 304"/>
         <p:cNvGrpSpPr/>
         <p:nvPr/>
       </p:nvGrpSpPr>
@@ -2522,7 +2522,7 @@
       </p:grpSpPr>
       <p:sp>
         <p:nvSpPr>
-          <p:cNvPr id="311" name="Google Shape;311;p24:notes"/>
+          <p:cNvPr id="305" name="Google Shape;305;p24:notes"/>
           <p:cNvSpPr txBox="1"/>
           <p:nvPr>
             <p:ph idx="1" type="body"/>
@@ -2561,7 +2561,7 @@
       </p:sp>
       <p:sp>
         <p:nvSpPr>
-          <p:cNvPr id="312" name="Google Shape;312;p24:notes"/>
+          <p:cNvPr id="306" name="Google Shape;306;p24:notes"/>
           <p:cNvSpPr/>
           <p:nvPr>
             <p:ph idx="2" type="sldImg"/>
@@ -2607,7 +2607,7 @@
   <p:cSld>
     <p:spTree>
       <p:nvGrpSpPr>
-        <p:cNvPr id="323" name="Shape 323"/>
+        <p:cNvPr id="317" name="Shape 317"/>
         <p:cNvGrpSpPr/>
         <p:nvPr/>
       </p:nvGrpSpPr>
@@ -2621,7 +2621,7 @@
       </p:grpSpPr>
       <p:sp>
         <p:nvSpPr>
-          <p:cNvPr id="324" name="Google Shape;324;p25:notes"/>
+          <p:cNvPr id="318" name="Google Shape;318;p25:notes"/>
           <p:cNvSpPr txBox="1"/>
           <p:nvPr>
             <p:ph idx="1" type="body"/>
@@ -2660,7 +2660,7 @@
       </p:sp>
       <p:sp>
         <p:nvSpPr>
-          <p:cNvPr id="325" name="Google Shape;325;p25:notes"/>
+          <p:cNvPr id="319" name="Google Shape;319;p25:notes"/>
           <p:cNvSpPr/>
           <p:nvPr>
             <p:ph idx="2" type="sldImg"/>
@@ -2706,7 +2706,7 @@
   <p:cSld>
     <p:spTree>
       <p:nvGrpSpPr>
-        <p:cNvPr id="336" name="Shape 336"/>
+        <p:cNvPr id="330" name="Shape 330"/>
         <p:cNvGrpSpPr/>
         <p:nvPr/>
       </p:nvGrpSpPr>
@@ -2720,7 +2720,7 @@
       </p:grpSpPr>
       <p:sp>
         <p:nvSpPr>
-          <p:cNvPr id="337" name="Google Shape;337;p26:notes"/>
+          <p:cNvPr id="331" name="Google Shape;331;p26:notes"/>
           <p:cNvSpPr txBox="1"/>
           <p:nvPr>
             <p:ph idx="1" type="body"/>
@@ -2759,7 +2759,7 @@
       </p:sp>
       <p:sp>
         <p:nvSpPr>
-          <p:cNvPr id="338" name="Google Shape;338;p26:notes"/>
+          <p:cNvPr id="332" name="Google Shape;332;p26:notes"/>
           <p:cNvSpPr/>
           <p:nvPr>
             <p:ph idx="2" type="sldImg"/>
@@ -2805,7 +2805,7 @@
   <p:cSld>
     <p:spTree>
       <p:nvGrpSpPr>
-        <p:cNvPr id="350" name="Shape 350"/>
+        <p:cNvPr id="344" name="Shape 344"/>
         <p:cNvGrpSpPr/>
         <p:nvPr/>
       </p:nvGrpSpPr>
@@ -2819,7 +2819,7 @@
       </p:grpSpPr>
       <p:sp>
         <p:nvSpPr>
-          <p:cNvPr id="351" name="Google Shape;351;p27:notes"/>
+          <p:cNvPr id="345" name="Google Shape;345;p27:notes"/>
           <p:cNvSpPr txBox="1"/>
           <p:nvPr>
             <p:ph idx="1" type="body"/>
@@ -2858,7 +2858,7 @@
       </p:sp>
       <p:sp>
         <p:nvSpPr>
-          <p:cNvPr id="352" name="Google Shape;352;p27:notes"/>
+          <p:cNvPr id="346" name="Google Shape;346;p27:notes"/>
           <p:cNvSpPr/>
           <p:nvPr>
             <p:ph idx="2" type="sldImg"/>
@@ -3003,7 +3003,7 @@
   <p:cSld>
     <p:spTree>
       <p:nvGrpSpPr>
-        <p:cNvPr id="360" name="Shape 360"/>
+        <p:cNvPr id="354" name="Shape 354"/>
         <p:cNvGrpSpPr/>
         <p:nvPr/>
       </p:nvGrpSpPr>
@@ -3017,7 +3017,7 @@
       </p:grpSpPr>
       <p:sp>
         <p:nvSpPr>
-          <p:cNvPr id="361" name="Google Shape;361;p28:notes"/>
+          <p:cNvPr id="355" name="Google Shape;355;p28:notes"/>
           <p:cNvSpPr txBox="1"/>
           <p:nvPr>
             <p:ph idx="1" type="body"/>
@@ -3056,7 +3056,7 @@
       </p:sp>
       <p:sp>
         <p:nvSpPr>
-          <p:cNvPr id="362" name="Google Shape;362;p28:notes"/>
+          <p:cNvPr id="356" name="Google Shape;356;p28:notes"/>
           <p:cNvSpPr/>
           <p:nvPr>
             <p:ph idx="2" type="sldImg"/>
@@ -3102,7 +3102,7 @@
   <p:cSld>
     <p:spTree>
       <p:nvGrpSpPr>
-        <p:cNvPr id="371" name="Shape 371"/>
+        <p:cNvPr id="365" name="Shape 365"/>
         <p:cNvGrpSpPr/>
         <p:nvPr/>
       </p:nvGrpSpPr>
@@ -3116,7 +3116,7 @@
       </p:grpSpPr>
       <p:sp>
         <p:nvSpPr>
-          <p:cNvPr id="372" name="Google Shape;372;p29:notes"/>
+          <p:cNvPr id="366" name="Google Shape;366;p29:notes"/>
           <p:cNvSpPr txBox="1"/>
           <p:nvPr>
             <p:ph idx="1" type="body"/>
@@ -3155,7 +3155,7 @@
       </p:sp>
       <p:sp>
         <p:nvSpPr>
-          <p:cNvPr id="373" name="Google Shape;373;p29:notes"/>
+          <p:cNvPr id="367" name="Google Shape;367;p29:notes"/>
           <p:cNvSpPr/>
           <p:nvPr>
             <p:ph idx="2" type="sldImg"/>
@@ -3201,7 +3201,7 @@
   <p:cSld>
     <p:spTree>
       <p:nvGrpSpPr>
-        <p:cNvPr id="382" name="Shape 382"/>
+        <p:cNvPr id="376" name="Shape 376"/>
         <p:cNvGrpSpPr/>
         <p:nvPr/>
       </p:nvGrpSpPr>
@@ -3215,7 +3215,7 @@
       </p:grpSpPr>
       <p:sp>
         <p:nvSpPr>
-          <p:cNvPr id="383" name="Google Shape;383;p30:notes"/>
+          <p:cNvPr id="377" name="Google Shape;377;p30:notes"/>
           <p:cNvSpPr txBox="1"/>
           <p:nvPr>
             <p:ph idx="1" type="body"/>
@@ -3254,7 +3254,7 @@
       </p:sp>
       <p:sp>
         <p:nvSpPr>
-          <p:cNvPr id="384" name="Google Shape;384;p30:notes"/>
+          <p:cNvPr id="378" name="Google Shape;378;p30:notes"/>
           <p:cNvSpPr/>
           <p:nvPr>
             <p:ph idx="2" type="sldImg"/>
@@ -3300,7 +3300,7 @@
   <p:cSld>
     <p:spTree>
       <p:nvGrpSpPr>
-        <p:cNvPr id="393" name="Shape 393"/>
+        <p:cNvPr id="387" name="Shape 387"/>
         <p:cNvGrpSpPr/>
         <p:nvPr/>
       </p:nvGrpSpPr>
@@ -3314,7 +3314,7 @@
       </p:grpSpPr>
       <p:sp>
         <p:nvSpPr>
-          <p:cNvPr id="394" name="Google Shape;394;p31:notes"/>
+          <p:cNvPr id="388" name="Google Shape;388;p31:notes"/>
           <p:cNvSpPr txBox="1"/>
           <p:nvPr>
             <p:ph idx="1" type="body"/>
@@ -3353,7 +3353,7 @@
       </p:sp>
       <p:sp>
         <p:nvSpPr>
-          <p:cNvPr id="395" name="Google Shape;395;p31:notes"/>
+          <p:cNvPr id="389" name="Google Shape;389;p31:notes"/>
           <p:cNvSpPr/>
           <p:nvPr>
             <p:ph idx="2" type="sldImg"/>
@@ -3399,7 +3399,7 @@
   <p:cSld>
     <p:spTree>
       <p:nvGrpSpPr>
-        <p:cNvPr id="405" name="Shape 405"/>
+        <p:cNvPr id="399" name="Shape 399"/>
         <p:cNvGrpSpPr/>
         <p:nvPr/>
       </p:nvGrpSpPr>
@@ -3413,7 +3413,7 @@
       </p:grpSpPr>
       <p:sp>
         <p:nvSpPr>
-          <p:cNvPr id="406" name="Google Shape;406;p32:notes"/>
+          <p:cNvPr id="400" name="Google Shape;400;p32:notes"/>
           <p:cNvSpPr txBox="1"/>
           <p:nvPr>
             <p:ph idx="1" type="body"/>
@@ -3452,7 +3452,7 @@
       </p:sp>
       <p:sp>
         <p:nvSpPr>
-          <p:cNvPr id="407" name="Google Shape;407;p32:notes"/>
+          <p:cNvPr id="401" name="Google Shape;401;p32:notes"/>
           <p:cNvSpPr/>
           <p:nvPr>
             <p:ph idx="2" type="sldImg"/>
@@ -3498,7 +3498,7 @@
   <p:cSld>
     <p:spTree>
       <p:nvGrpSpPr>
-        <p:cNvPr id="415" name="Shape 415"/>
+        <p:cNvPr id="409" name="Shape 409"/>
         <p:cNvGrpSpPr/>
         <p:nvPr/>
       </p:nvGrpSpPr>
@@ -3512,7 +3512,7 @@
       </p:grpSpPr>
       <p:sp>
         <p:nvSpPr>
-          <p:cNvPr id="416" name="Google Shape;416;p33:notes"/>
+          <p:cNvPr id="410" name="Google Shape;410;p33:notes"/>
           <p:cNvSpPr txBox="1"/>
           <p:nvPr>
             <p:ph idx="1" type="body"/>
@@ -3551,7 +3551,7 @@
       </p:sp>
       <p:sp>
         <p:nvSpPr>
-          <p:cNvPr id="417" name="Google Shape;417;p33:notes"/>
+          <p:cNvPr id="411" name="Google Shape;411;p33:notes"/>
           <p:cNvSpPr/>
           <p:nvPr>
             <p:ph idx="2" type="sldImg"/>
@@ -3597,7 +3597,7 @@
   <p:cSld>
     <p:spTree>
       <p:nvGrpSpPr>
-        <p:cNvPr id="421" name="Shape 421"/>
+        <p:cNvPr id="415" name="Shape 415"/>
         <p:cNvGrpSpPr/>
         <p:nvPr/>
       </p:nvGrpSpPr>
@@ -3611,7 +3611,7 @@
       </p:grpSpPr>
       <p:sp>
         <p:nvSpPr>
-          <p:cNvPr id="422" name="Google Shape;422;p34:notes"/>
+          <p:cNvPr id="416" name="Google Shape;416;p34:notes"/>
           <p:cNvSpPr txBox="1"/>
           <p:nvPr>
             <p:ph idx="1" type="body"/>
@@ -3650,7 +3650,7 @@
       </p:sp>
       <p:sp>
         <p:nvSpPr>
-          <p:cNvPr id="423" name="Google Shape;423;p34:notes"/>
+          <p:cNvPr id="417" name="Google Shape;417;p34:notes"/>
           <p:cNvSpPr/>
           <p:nvPr>
             <p:ph idx="2" type="sldImg"/>
@@ -3696,7 +3696,7 @@
   <p:cSld>
     <p:spTree>
       <p:nvGrpSpPr>
-        <p:cNvPr id="427" name="Shape 427"/>
+        <p:cNvPr id="421" name="Shape 421"/>
         <p:cNvGrpSpPr/>
         <p:nvPr/>
       </p:nvGrpSpPr>
@@ -3710,7 +3710,7 @@
       </p:grpSpPr>
       <p:sp>
         <p:nvSpPr>
-          <p:cNvPr id="428" name="Google Shape;428;p35:notes"/>
+          <p:cNvPr id="422" name="Google Shape;422;p35:notes"/>
           <p:cNvSpPr txBox="1"/>
           <p:nvPr>
             <p:ph idx="1" type="body"/>
@@ -3749,7 +3749,7 @@
       </p:sp>
       <p:sp>
         <p:nvSpPr>
-          <p:cNvPr id="429" name="Google Shape;429;p35:notes"/>
+          <p:cNvPr id="423" name="Google Shape;423;p35:notes"/>
           <p:cNvSpPr/>
           <p:nvPr>
             <p:ph idx="2" type="sldImg"/>
@@ -3795,7 +3795,7 @@
   <p:cSld>
     <p:spTree>
       <p:nvGrpSpPr>
-        <p:cNvPr id="433" name="Shape 433"/>
+        <p:cNvPr id="427" name="Shape 427"/>
         <p:cNvGrpSpPr/>
         <p:nvPr/>
       </p:nvGrpSpPr>
@@ -3809,7 +3809,7 @@
       </p:grpSpPr>
       <p:sp>
         <p:nvSpPr>
-          <p:cNvPr id="434" name="Google Shape;434;g60330c1be4_0_11:notes"/>
+          <p:cNvPr id="428" name="Google Shape;428;g60330c1be4_0_11:notes"/>
           <p:cNvSpPr/>
           <p:nvPr>
             <p:ph idx="2" type="sldImg"/>
@@ -3844,7 +3844,7 @@
       </p:sp>
       <p:sp>
         <p:nvSpPr>
-          <p:cNvPr id="435" name="Google Shape;435;g60330c1be4_0_11:notes"/>
+          <p:cNvPr id="429" name="Google Shape;429;g60330c1be4_0_11:notes"/>
           <p:cNvSpPr txBox="1"/>
           <p:nvPr>
             <p:ph idx="1" type="body"/>
@@ -3894,7 +3894,7 @@
   <p:cSld>
     <p:spTree>
       <p:nvGrpSpPr>
-        <p:cNvPr id="439" name="Shape 439"/>
+        <p:cNvPr id="433" name="Shape 433"/>
         <p:cNvGrpSpPr/>
         <p:nvPr/>
       </p:nvGrpSpPr>
@@ -3908,7 +3908,7 @@
       </p:grpSpPr>
       <p:sp>
         <p:nvSpPr>
-          <p:cNvPr id="440" name="Google Shape;440;p36:notes"/>
+          <p:cNvPr id="434" name="Google Shape;434;p36:notes"/>
           <p:cNvSpPr txBox="1"/>
           <p:nvPr>
             <p:ph idx="1" type="body"/>
@@ -3947,7 +3947,7 @@
       </p:sp>
       <p:sp>
         <p:nvSpPr>
-          <p:cNvPr id="441" name="Google Shape;441;p36:notes"/>
+          <p:cNvPr id="435" name="Google Shape;435;p36:notes"/>
           <p:cNvSpPr/>
           <p:nvPr>
             <p:ph idx="2" type="sldImg"/>
@@ -4092,7 +4092,7 @@
   <p:cSld>
     <p:spTree>
       <p:nvGrpSpPr>
-        <p:cNvPr id="445" name="Shape 445"/>
+        <p:cNvPr id="439" name="Shape 439"/>
         <p:cNvGrpSpPr/>
         <p:nvPr/>
       </p:nvGrpSpPr>
@@ -4106,7 +4106,7 @@
       </p:grpSpPr>
       <p:sp>
         <p:nvSpPr>
-          <p:cNvPr id="446" name="Google Shape;446;p37:notes"/>
+          <p:cNvPr id="440" name="Google Shape;440;p37:notes"/>
           <p:cNvSpPr txBox="1"/>
           <p:nvPr>
             <p:ph idx="1" type="body"/>
@@ -4145,7 +4145,7 @@
       </p:sp>
       <p:sp>
         <p:nvSpPr>
-          <p:cNvPr id="447" name="Google Shape;447;p37:notes"/>
+          <p:cNvPr id="441" name="Google Shape;441;p37:notes"/>
           <p:cNvSpPr/>
           <p:nvPr>
             <p:ph idx="2" type="sldImg"/>
@@ -4191,7 +4191,7 @@
   <p:cSld>
     <p:spTree>
       <p:nvGrpSpPr>
-        <p:cNvPr id="451" name="Shape 451"/>
+        <p:cNvPr id="445" name="Shape 445"/>
         <p:cNvGrpSpPr/>
         <p:nvPr/>
       </p:nvGrpSpPr>
@@ -4205,7 +4205,7 @@
       </p:grpSpPr>
       <p:sp>
         <p:nvSpPr>
-          <p:cNvPr id="452" name="Google Shape;452;p38:notes"/>
+          <p:cNvPr id="446" name="Google Shape;446;p38:notes"/>
           <p:cNvSpPr txBox="1"/>
           <p:nvPr>
             <p:ph idx="1" type="body"/>
@@ -4244,7 +4244,7 @@
       </p:sp>
       <p:sp>
         <p:nvSpPr>
-          <p:cNvPr id="453" name="Google Shape;453;p38:notes"/>
+          <p:cNvPr id="447" name="Google Shape;447;p38:notes"/>
           <p:cNvSpPr/>
           <p:nvPr>
             <p:ph idx="2" type="sldImg"/>
@@ -4290,7 +4290,7 @@
   <p:cSld>
     <p:spTree>
       <p:nvGrpSpPr>
-        <p:cNvPr id="458" name="Shape 458"/>
+        <p:cNvPr id="452" name="Shape 452"/>
         <p:cNvGrpSpPr/>
         <p:nvPr/>
       </p:nvGrpSpPr>
@@ -4304,7 +4304,7 @@
       </p:grpSpPr>
       <p:sp>
         <p:nvSpPr>
-          <p:cNvPr id="459" name="Google Shape;459;p39:notes"/>
+          <p:cNvPr id="453" name="Google Shape;453;p39:notes"/>
           <p:cNvSpPr txBox="1"/>
           <p:nvPr>
             <p:ph idx="1" type="body"/>
@@ -4343,7 +4343,7 @@
       </p:sp>
       <p:sp>
         <p:nvSpPr>
-          <p:cNvPr id="460" name="Google Shape;460;p39:notes"/>
+          <p:cNvPr id="454" name="Google Shape;454;p39:notes"/>
           <p:cNvSpPr/>
           <p:nvPr>
             <p:ph idx="2" type="sldImg"/>
@@ -4389,7 +4389,7 @@
   <p:cSld>
     <p:spTree>
       <p:nvGrpSpPr>
-        <p:cNvPr id="464" name="Shape 464"/>
+        <p:cNvPr id="458" name="Shape 458"/>
         <p:cNvGrpSpPr/>
         <p:nvPr/>
       </p:nvGrpSpPr>
@@ -4403,7 +4403,7 @@
       </p:grpSpPr>
       <p:sp>
         <p:nvSpPr>
-          <p:cNvPr id="465" name="Google Shape;465;p40:notes"/>
+          <p:cNvPr id="459" name="Google Shape;459;p40:notes"/>
           <p:cNvSpPr txBox="1"/>
           <p:nvPr>
             <p:ph idx="1" type="body"/>
@@ -4442,7 +4442,7 @@
       </p:sp>
       <p:sp>
         <p:nvSpPr>
-          <p:cNvPr id="466" name="Google Shape;466;p40:notes"/>
+          <p:cNvPr id="460" name="Google Shape;460;p40:notes"/>
           <p:cNvSpPr/>
           <p:nvPr>
             <p:ph idx="2" type="sldImg"/>
@@ -4488,7 +4488,7 @@
   <p:cSld>
     <p:spTree>
       <p:nvGrpSpPr>
-        <p:cNvPr id="470" name="Shape 470"/>
+        <p:cNvPr id="464" name="Shape 464"/>
         <p:cNvGrpSpPr/>
         <p:nvPr/>
       </p:nvGrpSpPr>
@@ -4502,7 +4502,7 @@
       </p:grpSpPr>
       <p:sp>
         <p:nvSpPr>
-          <p:cNvPr id="471" name="Google Shape;471;p41:notes"/>
+          <p:cNvPr id="465" name="Google Shape;465;p41:notes"/>
           <p:cNvSpPr txBox="1"/>
           <p:nvPr>
             <p:ph idx="1" type="body"/>
@@ -4541,7 +4541,7 @@
       </p:sp>
       <p:sp>
         <p:nvSpPr>
-          <p:cNvPr id="472" name="Google Shape;472;p41:notes"/>
+          <p:cNvPr id="466" name="Google Shape;466;p41:notes"/>
           <p:cNvSpPr/>
           <p:nvPr>
             <p:ph idx="2" type="sldImg"/>
@@ -4587,7 +4587,7 @@
   <p:cSld>
     <p:spTree>
       <p:nvGrpSpPr>
-        <p:cNvPr id="476" name="Shape 476"/>
+        <p:cNvPr id="470" name="Shape 470"/>
         <p:cNvGrpSpPr/>
         <p:nvPr/>
       </p:nvGrpSpPr>
@@ -4601,7 +4601,7 @@
       </p:grpSpPr>
       <p:sp>
         <p:nvSpPr>
-          <p:cNvPr id="477" name="Google Shape;477;p42:notes"/>
+          <p:cNvPr id="471" name="Google Shape;471;p42:notes"/>
           <p:cNvSpPr txBox="1"/>
           <p:nvPr>
             <p:ph idx="1" type="body"/>
@@ -4640,7 +4640,7 @@
       </p:sp>
       <p:sp>
         <p:nvSpPr>
-          <p:cNvPr id="478" name="Google Shape;478;p42:notes"/>
+          <p:cNvPr id="472" name="Google Shape;472;p42:notes"/>
           <p:cNvSpPr/>
           <p:nvPr>
             <p:ph idx="2" type="sldImg"/>
@@ -4686,7 +4686,7 @@
   <p:cSld>
     <p:spTree>
       <p:nvGrpSpPr>
-        <p:cNvPr id="482" name="Shape 482"/>
+        <p:cNvPr id="476" name="Shape 476"/>
         <p:cNvGrpSpPr/>
         <p:nvPr/>
       </p:nvGrpSpPr>
@@ -4700,7 +4700,7 @@
       </p:grpSpPr>
       <p:sp>
         <p:nvSpPr>
-          <p:cNvPr id="483" name="Google Shape;483;p43:notes"/>
+          <p:cNvPr id="477" name="Google Shape;477;p43:notes"/>
           <p:cNvSpPr txBox="1"/>
           <p:nvPr>
             <p:ph idx="1" type="body"/>
@@ -4739,7 +4739,7 @@
       </p:sp>
       <p:sp>
         <p:nvSpPr>
-          <p:cNvPr id="484" name="Google Shape;484;p43:notes"/>
+          <p:cNvPr id="478" name="Google Shape;478;p43:notes"/>
           <p:cNvSpPr/>
           <p:nvPr>
             <p:ph idx="2" type="sldImg"/>
@@ -4785,7 +4785,7 @@
   <p:cSld>
     <p:spTree>
       <p:nvGrpSpPr>
-        <p:cNvPr id="488" name="Shape 488"/>
+        <p:cNvPr id="482" name="Shape 482"/>
         <p:cNvGrpSpPr/>
         <p:nvPr/>
       </p:nvGrpSpPr>
@@ -4799,7 +4799,7 @@
       </p:grpSpPr>
       <p:sp>
         <p:nvSpPr>
-          <p:cNvPr id="489" name="Google Shape;489;p44:notes"/>
+          <p:cNvPr id="483" name="Google Shape;483;p44:notes"/>
           <p:cNvSpPr txBox="1"/>
           <p:nvPr>
             <p:ph idx="1" type="body"/>
@@ -4838,7 +4838,7 @@
       </p:sp>
       <p:sp>
         <p:nvSpPr>
-          <p:cNvPr id="490" name="Google Shape;490;p44:notes"/>
+          <p:cNvPr id="484" name="Google Shape;484;p44:notes"/>
           <p:cNvSpPr/>
           <p:nvPr>
             <p:ph idx="2" type="sldImg"/>
@@ -4884,7 +4884,7 @@
   <p:cSld>
     <p:spTree>
       <p:nvGrpSpPr>
-        <p:cNvPr id="494" name="Shape 494"/>
+        <p:cNvPr id="488" name="Shape 488"/>
         <p:cNvGrpSpPr/>
         <p:nvPr/>
       </p:nvGrpSpPr>
@@ -4898,7 +4898,7 @@
       </p:grpSpPr>
       <p:sp>
         <p:nvSpPr>
-          <p:cNvPr id="495" name="Google Shape;495;p45:notes"/>
+          <p:cNvPr id="489" name="Google Shape;489;p45:notes"/>
           <p:cNvSpPr txBox="1"/>
           <p:nvPr>
             <p:ph idx="1" type="body"/>
@@ -4937,7 +4937,7 @@
       </p:sp>
       <p:sp>
         <p:nvSpPr>
-          <p:cNvPr id="496" name="Google Shape;496;p45:notes"/>
+          <p:cNvPr id="490" name="Google Shape;490;p45:notes"/>
           <p:cNvSpPr/>
           <p:nvPr>
             <p:ph idx="2" type="sldImg"/>
@@ -4983,7 +4983,7 @@
   <p:cSld>
     <p:spTree>
       <p:nvGrpSpPr>
-        <p:cNvPr id="500" name="Shape 500"/>
+        <p:cNvPr id="494" name="Shape 494"/>
         <p:cNvGrpSpPr/>
         <p:nvPr/>
       </p:nvGrpSpPr>
@@ -4997,7 +4997,7 @@
       </p:grpSpPr>
       <p:sp>
         <p:nvSpPr>
-          <p:cNvPr id="501" name="Google Shape;501;p46:notes"/>
+          <p:cNvPr id="495" name="Google Shape;495;p46:notes"/>
           <p:cNvSpPr txBox="1"/>
           <p:nvPr>
             <p:ph idx="1" type="body"/>
@@ -5036,7 +5036,7 @@
       </p:sp>
       <p:sp>
         <p:nvSpPr>
-          <p:cNvPr id="502" name="Google Shape;502;p46:notes"/>
+          <p:cNvPr id="496" name="Google Shape;496;p46:notes"/>
           <p:cNvSpPr/>
           <p:nvPr>
             <p:ph idx="2" type="sldImg"/>
@@ -5181,7 +5181,7 @@
   <p:cSld>
     <p:spTree>
       <p:nvGrpSpPr>
-        <p:cNvPr id="508" name="Shape 508"/>
+        <p:cNvPr id="502" name="Shape 502"/>
         <p:cNvGrpSpPr/>
         <p:nvPr/>
       </p:nvGrpSpPr>
@@ -5195,7 +5195,7 @@
       </p:grpSpPr>
       <p:sp>
         <p:nvSpPr>
-          <p:cNvPr id="509" name="Google Shape;509;p47:notes"/>
+          <p:cNvPr id="503" name="Google Shape;503;p47:notes"/>
           <p:cNvSpPr txBox="1"/>
           <p:nvPr>
             <p:ph idx="1" type="body"/>
@@ -5234,7 +5234,7 @@
       </p:sp>
       <p:sp>
         <p:nvSpPr>
-          <p:cNvPr id="510" name="Google Shape;510;p47:notes"/>
+          <p:cNvPr id="504" name="Google Shape;504;p47:notes"/>
           <p:cNvSpPr/>
           <p:nvPr>
             <p:ph idx="2" type="sldImg"/>
@@ -5280,7 +5280,7 @@
   <p:cSld>
     <p:spTree>
       <p:nvGrpSpPr>
-        <p:cNvPr id="514" name="Shape 514"/>
+        <p:cNvPr id="508" name="Shape 508"/>
         <p:cNvGrpSpPr/>
         <p:nvPr/>
       </p:nvGrpSpPr>
@@ -5294,7 +5294,7 @@
       </p:grpSpPr>
       <p:sp>
         <p:nvSpPr>
-          <p:cNvPr id="515" name="Google Shape;515;p48:notes"/>
+          <p:cNvPr id="509" name="Google Shape;509;p48:notes"/>
           <p:cNvSpPr txBox="1"/>
           <p:nvPr>
             <p:ph idx="1" type="body"/>
@@ -5333,7 +5333,7 @@
       </p:sp>
       <p:sp>
         <p:nvSpPr>
-          <p:cNvPr id="516" name="Google Shape;516;p48:notes"/>
+          <p:cNvPr id="510" name="Google Shape;510;p48:notes"/>
           <p:cNvSpPr/>
           <p:nvPr>
             <p:ph idx="2" type="sldImg"/>
@@ -5379,7 +5379,7 @@
   <p:cSld>
     <p:spTree>
       <p:nvGrpSpPr>
-        <p:cNvPr id="520" name="Shape 520"/>
+        <p:cNvPr id="514" name="Shape 514"/>
         <p:cNvGrpSpPr/>
         <p:nvPr/>
       </p:nvGrpSpPr>
@@ -5393,7 +5393,7 @@
       </p:grpSpPr>
       <p:sp>
         <p:nvSpPr>
-          <p:cNvPr id="521" name="Google Shape;521;p49:notes"/>
+          <p:cNvPr id="515" name="Google Shape;515;p49:notes"/>
           <p:cNvSpPr txBox="1"/>
           <p:nvPr>
             <p:ph idx="1" type="body"/>
@@ -5432,7 +5432,7 @@
       </p:sp>
       <p:sp>
         <p:nvSpPr>
-          <p:cNvPr id="522" name="Google Shape;522;p49:notes"/>
+          <p:cNvPr id="516" name="Google Shape;516;p49:notes"/>
           <p:cNvSpPr/>
           <p:nvPr>
             <p:ph idx="2" type="sldImg"/>
@@ -15183,108 +15183,9 @@
           </a:p>
         </p:txBody>
       </p:sp>
-      <p:sp>
-        <p:nvSpPr>
-          <p:cNvPr id="194" name="Google Shape;194;p30"/>
-          <p:cNvSpPr txBox="1"/>
-          <p:nvPr/>
-        </p:nvSpPr>
-        <p:spPr>
-          <a:xfrm>
-            <a:off x="5562600" y="4419600"/>
-            <a:ext cx="1944000" cy="346200"/>
-          </a:xfrm>
-          <a:prstGeom prst="rect">
-            <a:avLst/>
-          </a:prstGeom>
-          <a:noFill/>
-          <a:ln>
-            <a:noFill/>
-          </a:ln>
-        </p:spPr>
-        <p:txBody>
-          <a:bodyPr anchorCtr="0" anchor="t" bIns="45000" lIns="90000" spcFirstLastPara="1" rIns="90000" wrap="square" tIns="45000">
-            <a:noAutofit/>
-          </a:bodyPr>
-          <a:lstStyle/>
-          <a:p>
-            <a:pPr indent="0" lvl="0" marL="0" marR="0" rtl="0" algn="l">
-              <a:spcBef>
-                <a:spcPts val="0"/>
-              </a:spcBef>
-              <a:spcAft>
-                <a:spcPts val="0"/>
-              </a:spcAft>
-              <a:buNone/>
-            </a:pPr>
-            <a:r>
-              <a:rPr lang="en-GB" sz="1800"/>
-              <a:t>“Kerek” + Ferde</a:t>
-            </a:r>
-            <a:endParaRPr b="0" sz="1800" strike="noStrike">
-              <a:latin typeface="Arial"/>
-              <a:ea typeface="Arial"/>
-              <a:cs typeface="Arial"/>
-              <a:sym typeface="Arial"/>
-            </a:endParaRPr>
-          </a:p>
-        </p:txBody>
-      </p:sp>
-      <p:sp>
-        <p:nvSpPr>
-          <p:cNvPr id="195" name="Google Shape;195;p30"/>
-          <p:cNvSpPr txBox="1"/>
-          <p:nvPr/>
-        </p:nvSpPr>
-        <p:spPr>
-          <a:xfrm>
-            <a:off x="8001000" y="4419600"/>
-            <a:ext cx="1486800" cy="381000"/>
-          </a:xfrm>
-          <a:prstGeom prst="rect">
-            <a:avLst/>
-          </a:prstGeom>
-          <a:noFill/>
-          <a:ln>
-            <a:noFill/>
-          </a:ln>
-        </p:spPr>
-        <p:txBody>
-          <a:bodyPr anchorCtr="0" anchor="t" bIns="45000" lIns="90000" spcFirstLastPara="1" rIns="90000" wrap="square" tIns="45000">
-            <a:noAutofit/>
-          </a:bodyPr>
-          <a:lstStyle/>
-          <a:p>
-            <a:pPr indent="0" lvl="0" marL="0" marR="0" rtl="0" algn="l">
-              <a:spcBef>
-                <a:spcPts val="0"/>
-              </a:spcBef>
-              <a:spcAft>
-                <a:spcPts val="0"/>
-              </a:spcAft>
-              <a:buNone/>
-            </a:pPr>
-            <a:r>
-              <a:rPr b="0" lang="en-GB" sz="1800" strike="noStrike">
-                <a:latin typeface="Arial"/>
-                <a:ea typeface="Arial"/>
-                <a:cs typeface="Arial"/>
-                <a:sym typeface="Arial"/>
-              </a:rPr>
-              <a:t>Egész kerek</a:t>
-            </a:r>
-            <a:endParaRPr b="0" sz="1800" strike="noStrike">
-              <a:latin typeface="Arial"/>
-              <a:ea typeface="Arial"/>
-              <a:cs typeface="Arial"/>
-              <a:sym typeface="Arial"/>
-            </a:endParaRPr>
-          </a:p>
-        </p:txBody>
-      </p:sp>
       <p:pic>
         <p:nvPicPr>
-          <p:cNvPr id="196" name="Google Shape;196;p30"/>
+          <p:cNvPr id="194" name="Google Shape;194;p30"/>
           <p:cNvPicPr preferRelativeResize="0"/>
           <p:nvPr/>
         </p:nvPicPr>
@@ -15311,7 +15212,7 @@
       </p:pic>
       <p:sp>
         <p:nvSpPr>
-          <p:cNvPr id="197" name="Google Shape;197;p30"/>
+          <p:cNvPr id="195" name="Google Shape;195;p30"/>
           <p:cNvSpPr txBox="1"/>
           <p:nvPr/>
         </p:nvSpPr>
@@ -15367,7 +15268,7 @@
       </p:sp>
       <p:sp>
         <p:nvSpPr>
-          <p:cNvPr id="198" name="Google Shape;198;p30"/>
+          <p:cNvPr id="196" name="Google Shape;196;p30"/>
           <p:cNvSpPr txBox="1"/>
           <p:nvPr/>
         </p:nvSpPr>
@@ -15419,7 +15320,7 @@
       </p:sp>
       <p:sp>
         <p:nvSpPr>
-          <p:cNvPr id="199" name="Google Shape;199;p30"/>
+          <p:cNvPr id="197" name="Google Shape;197;p30"/>
           <p:cNvSpPr txBox="1"/>
           <p:nvPr/>
         </p:nvSpPr>
@@ -15471,7 +15372,7 @@
       </p:sp>
       <p:pic>
         <p:nvPicPr>
-          <p:cNvPr id="200" name="Google Shape;200;p30"/>
+          <p:cNvPr id="198" name="Google Shape;198;p30"/>
           <p:cNvPicPr preferRelativeResize="0"/>
           <p:nvPr/>
         </p:nvPicPr>
@@ -15498,7 +15399,7 @@
       </p:pic>
       <p:pic>
         <p:nvPicPr>
-          <p:cNvPr id="201" name="Google Shape;201;p30"/>
+          <p:cNvPr id="199" name="Google Shape;199;p30"/>
           <p:cNvPicPr preferRelativeResize="0"/>
           <p:nvPr/>
         </p:nvPicPr>
@@ -15525,7 +15426,7 @@
       </p:pic>
       <p:pic>
         <p:nvPicPr>
-          <p:cNvPr id="202" name="Google Shape;202;p30"/>
+          <p:cNvPr id="200" name="Google Shape;200;p30"/>
           <p:cNvPicPr preferRelativeResize="0"/>
           <p:nvPr/>
         </p:nvPicPr>
@@ -15552,7 +15453,7 @@
       </p:pic>
       <p:sp>
         <p:nvSpPr>
-          <p:cNvPr id="203" name="Google Shape;203;p30"/>
+          <p:cNvPr id="201" name="Google Shape;201;p30"/>
           <p:cNvSpPr txBox="1"/>
           <p:nvPr/>
         </p:nvSpPr>
@@ -15615,7 +15516,7 @@
   <p:cSld>
     <p:spTree>
       <p:nvGrpSpPr>
-        <p:cNvPr id="207" name="Shape 207"/>
+        <p:cNvPr id="205" name="Shape 205"/>
         <p:cNvGrpSpPr/>
         <p:nvPr/>
       </p:nvGrpSpPr>
@@ -15629,7 +15530,7 @@
       </p:grpSpPr>
       <p:sp>
         <p:nvSpPr>
-          <p:cNvPr id="208" name="Google Shape;208;p31"/>
+          <p:cNvPr id="206" name="Google Shape;206;p31"/>
           <p:cNvSpPr txBox="1"/>
           <p:nvPr/>
         </p:nvSpPr>
@@ -15711,7 +15612,7 @@
       </p:sp>
       <p:pic>
         <p:nvPicPr>
-          <p:cNvPr id="209" name="Google Shape;209;p31"/>
+          <p:cNvPr id="207" name="Google Shape;207;p31"/>
           <p:cNvPicPr preferRelativeResize="0"/>
           <p:nvPr/>
         </p:nvPicPr>
@@ -15738,7 +15639,7 @@
       </p:pic>
       <p:sp>
         <p:nvSpPr>
-          <p:cNvPr id="210" name="Google Shape;210;p31"/>
+          <p:cNvPr id="208" name="Google Shape;208;p31"/>
           <p:cNvSpPr txBox="1"/>
           <p:nvPr/>
         </p:nvSpPr>
@@ -15794,7 +15695,7 @@
       </p:sp>
       <p:sp>
         <p:nvSpPr>
-          <p:cNvPr id="211" name="Google Shape;211;p31"/>
+          <p:cNvPr id="209" name="Google Shape;209;p31"/>
           <p:cNvSpPr txBox="1"/>
           <p:nvPr/>
         </p:nvSpPr>
@@ -15846,7 +15747,7 @@
       </p:sp>
       <p:sp>
         <p:nvSpPr>
-          <p:cNvPr id="212" name="Google Shape;212;p31"/>
+          <p:cNvPr id="210" name="Google Shape;210;p31"/>
           <p:cNvSpPr txBox="1"/>
           <p:nvPr/>
         </p:nvSpPr>
@@ -15898,7 +15799,7 @@
       </p:sp>
       <p:pic>
         <p:nvPicPr>
-          <p:cNvPr id="213" name="Google Shape;213;p31"/>
+          <p:cNvPr id="211" name="Google Shape;211;p31"/>
           <p:cNvPicPr preferRelativeResize="0"/>
           <p:nvPr/>
         </p:nvPicPr>
@@ -15925,7 +15826,7 @@
       </p:pic>
       <p:pic>
         <p:nvPicPr>
-          <p:cNvPr id="214" name="Google Shape;214;p31"/>
+          <p:cNvPr id="212" name="Google Shape;212;p31"/>
           <p:cNvPicPr preferRelativeResize="0"/>
           <p:nvPr/>
         </p:nvPicPr>
@@ -15952,7 +15853,7 @@
       </p:pic>
       <p:pic>
         <p:nvPicPr>
-          <p:cNvPr id="215" name="Google Shape;215;p31"/>
+          <p:cNvPr id="213" name="Google Shape;213;p31"/>
           <p:cNvPicPr preferRelativeResize="0"/>
           <p:nvPr/>
         </p:nvPicPr>
@@ -15979,7 +15880,7 @@
       </p:pic>
       <p:sp>
         <p:nvSpPr>
-          <p:cNvPr id="216" name="Google Shape;216;p31"/>
+          <p:cNvPr id="214" name="Google Shape;214;p31"/>
           <p:cNvSpPr txBox="1"/>
           <p:nvPr/>
         </p:nvSpPr>
@@ -16042,7 +15943,7 @@
   <p:cSld>
     <p:spTree>
       <p:nvGrpSpPr>
-        <p:cNvPr id="220" name="Shape 220"/>
+        <p:cNvPr id="218" name="Shape 218"/>
         <p:cNvGrpSpPr/>
         <p:nvPr/>
       </p:nvGrpSpPr>
@@ -16056,7 +15957,7 @@
       </p:grpSpPr>
       <p:sp>
         <p:nvSpPr>
-          <p:cNvPr id="221" name="Google Shape;221;p32"/>
+          <p:cNvPr id="219" name="Google Shape;219;p32"/>
           <p:cNvSpPr txBox="1"/>
           <p:nvPr/>
         </p:nvSpPr>
@@ -16127,108 +16028,9 @@
           </a:p>
         </p:txBody>
       </p:sp>
-      <p:sp>
-        <p:nvSpPr>
-          <p:cNvPr id="222" name="Google Shape;222;p32"/>
-          <p:cNvSpPr txBox="1"/>
-          <p:nvPr/>
-        </p:nvSpPr>
-        <p:spPr>
-          <a:xfrm>
-            <a:off x="5562600" y="4419600"/>
-            <a:ext cx="1944000" cy="346200"/>
-          </a:xfrm>
-          <a:prstGeom prst="rect">
-            <a:avLst/>
-          </a:prstGeom>
-          <a:noFill/>
-          <a:ln>
-            <a:noFill/>
-          </a:ln>
-        </p:spPr>
-        <p:txBody>
-          <a:bodyPr anchorCtr="0" anchor="t" bIns="45000" lIns="90000" spcFirstLastPara="1" rIns="90000" wrap="square" tIns="45000">
-            <a:noAutofit/>
-          </a:bodyPr>
-          <a:lstStyle/>
-          <a:p>
-            <a:pPr indent="0" lvl="0" marL="0" marR="0" rtl="0" algn="l">
-              <a:spcBef>
-                <a:spcPts val="0"/>
-              </a:spcBef>
-              <a:spcAft>
-                <a:spcPts val="0"/>
-              </a:spcAft>
-              <a:buNone/>
-            </a:pPr>
-            <a:r>
-              <a:rPr lang="en-GB" sz="1800"/>
-              <a:t>“Kerek” + Ferde</a:t>
-            </a:r>
-            <a:endParaRPr b="0" sz="1800" strike="noStrike">
-              <a:latin typeface="Arial"/>
-              <a:ea typeface="Arial"/>
-              <a:cs typeface="Arial"/>
-              <a:sym typeface="Arial"/>
-            </a:endParaRPr>
-          </a:p>
-        </p:txBody>
-      </p:sp>
-      <p:sp>
-        <p:nvSpPr>
-          <p:cNvPr id="223" name="Google Shape;223;p32"/>
-          <p:cNvSpPr txBox="1"/>
-          <p:nvPr/>
-        </p:nvSpPr>
-        <p:spPr>
-          <a:xfrm>
-            <a:off x="8001000" y="4419600"/>
-            <a:ext cx="1486800" cy="381000"/>
-          </a:xfrm>
-          <a:prstGeom prst="rect">
-            <a:avLst/>
-          </a:prstGeom>
-          <a:noFill/>
-          <a:ln>
-            <a:noFill/>
-          </a:ln>
-        </p:spPr>
-        <p:txBody>
-          <a:bodyPr anchorCtr="0" anchor="t" bIns="45000" lIns="90000" spcFirstLastPara="1" rIns="90000" wrap="square" tIns="45000">
-            <a:noAutofit/>
-          </a:bodyPr>
-          <a:lstStyle/>
-          <a:p>
-            <a:pPr indent="0" lvl="0" marL="0" marR="0" rtl="0" algn="l">
-              <a:spcBef>
-                <a:spcPts val="0"/>
-              </a:spcBef>
-              <a:spcAft>
-                <a:spcPts val="0"/>
-              </a:spcAft>
-              <a:buNone/>
-            </a:pPr>
-            <a:r>
-              <a:rPr b="0" lang="en-GB" sz="1800" strike="noStrike">
-                <a:latin typeface="Arial"/>
-                <a:ea typeface="Arial"/>
-                <a:cs typeface="Arial"/>
-                <a:sym typeface="Arial"/>
-              </a:rPr>
-              <a:t>Egész kerek</a:t>
-            </a:r>
-            <a:endParaRPr b="0" sz="1800" strike="noStrike">
-              <a:latin typeface="Arial"/>
-              <a:ea typeface="Arial"/>
-              <a:cs typeface="Arial"/>
-              <a:sym typeface="Arial"/>
-            </a:endParaRPr>
-          </a:p>
-        </p:txBody>
-      </p:sp>
       <p:pic>
         <p:nvPicPr>
-          <p:cNvPr id="224" name="Google Shape;224;p32"/>
+          <p:cNvPr id="220" name="Google Shape;220;p32"/>
           <p:cNvPicPr preferRelativeResize="0"/>
           <p:nvPr/>
         </p:nvPicPr>
@@ -16255,7 +16057,7 @@
       </p:pic>
       <p:sp>
         <p:nvSpPr>
-          <p:cNvPr id="225" name="Google Shape;225;p32"/>
+          <p:cNvPr id="221" name="Google Shape;221;p32"/>
           <p:cNvSpPr txBox="1"/>
           <p:nvPr/>
         </p:nvSpPr>
@@ -16311,7 +16113,7 @@
       </p:sp>
       <p:sp>
         <p:nvSpPr>
-          <p:cNvPr id="226" name="Google Shape;226;p32"/>
+          <p:cNvPr id="222" name="Google Shape;222;p32"/>
           <p:cNvSpPr txBox="1"/>
           <p:nvPr/>
         </p:nvSpPr>
@@ -16363,7 +16165,7 @@
       </p:sp>
       <p:sp>
         <p:nvSpPr>
-          <p:cNvPr id="227" name="Google Shape;227;p32"/>
+          <p:cNvPr id="223" name="Google Shape;223;p32"/>
           <p:cNvSpPr txBox="1"/>
           <p:nvPr/>
         </p:nvSpPr>
@@ -16415,7 +16217,7 @@
       </p:sp>
       <p:pic>
         <p:nvPicPr>
-          <p:cNvPr id="228" name="Google Shape;228;p32"/>
+          <p:cNvPr id="224" name="Google Shape;224;p32"/>
           <p:cNvPicPr preferRelativeResize="0"/>
           <p:nvPr/>
         </p:nvPicPr>
@@ -16442,7 +16244,7 @@
       </p:pic>
       <p:pic>
         <p:nvPicPr>
-          <p:cNvPr id="229" name="Google Shape;229;p32"/>
+          <p:cNvPr id="225" name="Google Shape;225;p32"/>
           <p:cNvPicPr preferRelativeResize="0"/>
           <p:nvPr/>
         </p:nvPicPr>
@@ -16469,7 +16271,7 @@
       </p:pic>
       <p:pic>
         <p:nvPicPr>
-          <p:cNvPr id="230" name="Google Shape;230;p32"/>
+          <p:cNvPr id="226" name="Google Shape;226;p32"/>
           <p:cNvPicPr preferRelativeResize="0"/>
           <p:nvPr/>
         </p:nvPicPr>
@@ -16496,7 +16298,7 @@
       </p:pic>
       <p:sp>
         <p:nvSpPr>
-          <p:cNvPr id="231" name="Google Shape;231;p32"/>
+          <p:cNvPr id="227" name="Google Shape;227;p32"/>
           <p:cNvSpPr txBox="1"/>
           <p:nvPr/>
         </p:nvSpPr>
@@ -16548,13 +16350,13 @@
       </p:sp>
       <p:sp>
         <p:nvSpPr>
-          <p:cNvPr id="232" name="Google Shape;232;p32"/>
+          <p:cNvPr id="228" name="Google Shape;228;p32"/>
           <p:cNvSpPr txBox="1"/>
           <p:nvPr/>
         </p:nvSpPr>
         <p:spPr>
           <a:xfrm>
-            <a:off x="2209800" y="4953000"/>
+            <a:off x="2209800" y="4495800"/>
             <a:ext cx="7315200" cy="1447800"/>
           </a:xfrm>
           <a:prstGeom prst="rect">
@@ -16729,7 +16531,7 @@
   <p:cSld>
     <p:spTree>
       <p:nvGrpSpPr>
-        <p:cNvPr id="236" name="Shape 236"/>
+        <p:cNvPr id="232" name="Shape 232"/>
         <p:cNvGrpSpPr/>
         <p:nvPr/>
       </p:nvGrpSpPr>
@@ -16743,7 +16545,7 @@
       </p:grpSpPr>
       <p:sp>
         <p:nvSpPr>
-          <p:cNvPr id="237" name="Google Shape;237;p33"/>
+          <p:cNvPr id="233" name="Google Shape;233;p33"/>
           <p:cNvSpPr txBox="1"/>
           <p:nvPr/>
         </p:nvSpPr>
@@ -16816,7 +16618,7 @@
       </p:sp>
       <p:sp>
         <p:nvSpPr>
-          <p:cNvPr id="238" name="Google Shape;238;p33"/>
+          <p:cNvPr id="234" name="Google Shape;234;p33"/>
           <p:cNvSpPr txBox="1"/>
           <p:nvPr/>
         </p:nvSpPr>
@@ -16872,7 +16674,7 @@
       </p:sp>
       <p:sp>
         <p:nvSpPr>
-          <p:cNvPr id="239" name="Google Shape;239;p33"/>
+          <p:cNvPr id="235" name="Google Shape;235;p33"/>
           <p:cNvSpPr txBox="1"/>
           <p:nvPr/>
         </p:nvSpPr>
@@ -16924,7 +16726,7 @@
       </p:sp>
       <p:sp>
         <p:nvSpPr>
-          <p:cNvPr id="240" name="Google Shape;240;p33"/>
+          <p:cNvPr id="236" name="Google Shape;236;p33"/>
           <p:cNvSpPr txBox="1"/>
           <p:nvPr/>
         </p:nvSpPr>
@@ -16976,7 +16778,7 @@
       </p:sp>
       <p:pic>
         <p:nvPicPr>
-          <p:cNvPr id="241" name="Google Shape;241;p33"/>
+          <p:cNvPr id="237" name="Google Shape;237;p33"/>
           <p:cNvPicPr preferRelativeResize="0"/>
           <p:nvPr/>
         </p:nvPicPr>
@@ -17003,7 +16805,7 @@
       </p:pic>
       <p:pic>
         <p:nvPicPr>
-          <p:cNvPr id="242" name="Google Shape;242;p33"/>
+          <p:cNvPr id="238" name="Google Shape;238;p33"/>
           <p:cNvPicPr preferRelativeResize="0"/>
           <p:nvPr/>
         </p:nvPicPr>
@@ -17030,7 +16832,7 @@
       </p:pic>
       <p:sp>
         <p:nvSpPr>
-          <p:cNvPr id="243" name="Google Shape;243;p33"/>
+          <p:cNvPr id="239" name="Google Shape;239;p33"/>
           <p:cNvSpPr txBox="1"/>
           <p:nvPr/>
         </p:nvSpPr>
@@ -17093,7 +16895,7 @@
   <p:cSld>
     <p:spTree>
       <p:nvGrpSpPr>
-        <p:cNvPr id="247" name="Shape 247"/>
+        <p:cNvPr id="243" name="Shape 243"/>
         <p:cNvGrpSpPr/>
         <p:nvPr/>
       </p:nvGrpSpPr>
@@ -17107,7 +16909,7 @@
       </p:grpSpPr>
       <p:sp>
         <p:nvSpPr>
-          <p:cNvPr id="248" name="Google Shape;248;p34"/>
+          <p:cNvPr id="244" name="Google Shape;244;p34"/>
           <p:cNvSpPr txBox="1"/>
           <p:nvPr/>
         </p:nvSpPr>
@@ -17189,14 +16991,14 @@
       </p:sp>
       <p:sp>
         <p:nvSpPr>
-          <p:cNvPr id="249" name="Google Shape;249;p34"/>
+          <p:cNvPr id="245" name="Google Shape;245;p34"/>
           <p:cNvSpPr txBox="1"/>
           <p:nvPr/>
         </p:nvSpPr>
         <p:spPr>
           <a:xfrm>
-            <a:off x="3672000" y="5109840"/>
-            <a:ext cx="6048000" cy="858240"/>
+            <a:off x="3672000" y="4652640"/>
+            <a:ext cx="6048000" cy="858300"/>
           </a:xfrm>
           <a:prstGeom prst="rect">
             <a:avLst/>
@@ -17277,7 +17079,7 @@
       </p:sp>
       <p:sp>
         <p:nvSpPr>
-          <p:cNvPr id="250" name="Google Shape;250;p34"/>
+          <p:cNvPr id="246" name="Google Shape;246;p34"/>
           <p:cNvSpPr txBox="1"/>
           <p:nvPr/>
         </p:nvSpPr>
@@ -17333,7 +17135,7 @@
       </p:sp>
       <p:sp>
         <p:nvSpPr>
-          <p:cNvPr id="251" name="Google Shape;251;p34"/>
+          <p:cNvPr id="247" name="Google Shape;247;p34"/>
           <p:cNvSpPr txBox="1"/>
           <p:nvPr/>
         </p:nvSpPr>
@@ -17385,7 +17187,7 @@
       </p:sp>
       <p:sp>
         <p:nvSpPr>
-          <p:cNvPr id="252" name="Google Shape;252;p34"/>
+          <p:cNvPr id="248" name="Google Shape;248;p34"/>
           <p:cNvSpPr txBox="1"/>
           <p:nvPr/>
         </p:nvSpPr>
@@ -17437,7 +17239,7 @@
       </p:sp>
       <p:pic>
         <p:nvPicPr>
-          <p:cNvPr id="253" name="Google Shape;253;p34"/>
+          <p:cNvPr id="249" name="Google Shape;249;p34"/>
           <p:cNvPicPr preferRelativeResize="0"/>
           <p:nvPr/>
         </p:nvPicPr>
@@ -17464,7 +17266,7 @@
       </p:pic>
       <p:pic>
         <p:nvPicPr>
-          <p:cNvPr id="254" name="Google Shape;254;p34"/>
+          <p:cNvPr id="250" name="Google Shape;250;p34"/>
           <p:cNvPicPr preferRelativeResize="0"/>
           <p:nvPr/>
         </p:nvPicPr>
@@ -17491,7 +17293,7 @@
       </p:pic>
       <p:sp>
         <p:nvSpPr>
-          <p:cNvPr id="255" name="Google Shape;255;p34"/>
+          <p:cNvPr id="251" name="Google Shape;251;p34"/>
           <p:cNvSpPr txBox="1"/>
           <p:nvPr/>
         </p:nvSpPr>
@@ -17554,7 +17356,7 @@
   <p:cSld>
     <p:spTree>
       <p:nvGrpSpPr>
-        <p:cNvPr id="259" name="Shape 259"/>
+        <p:cNvPr id="255" name="Shape 255"/>
         <p:cNvGrpSpPr/>
         <p:nvPr/>
       </p:nvGrpSpPr>
@@ -17568,7 +17370,7 @@
       </p:grpSpPr>
       <p:sp>
         <p:nvSpPr>
-          <p:cNvPr id="260" name="Google Shape;260;p35"/>
+          <p:cNvPr id="256" name="Google Shape;256;p35"/>
           <p:cNvSpPr txBox="1"/>
           <p:nvPr/>
         </p:nvSpPr>
@@ -17641,7 +17443,7 @@
       </p:sp>
       <p:sp>
         <p:nvSpPr>
-          <p:cNvPr id="261" name="Google Shape;261;p35"/>
+          <p:cNvPr id="257" name="Google Shape;257;p35"/>
           <p:cNvSpPr txBox="1"/>
           <p:nvPr/>
         </p:nvSpPr>
@@ -17697,7 +17499,7 @@
       </p:sp>
       <p:sp>
         <p:nvSpPr>
-          <p:cNvPr id="262" name="Google Shape;262;p35"/>
+          <p:cNvPr id="258" name="Google Shape;258;p35"/>
           <p:cNvSpPr txBox="1"/>
           <p:nvPr/>
         </p:nvSpPr>
@@ -17749,7 +17551,7 @@
       </p:sp>
       <p:sp>
         <p:nvSpPr>
-          <p:cNvPr id="263" name="Google Shape;263;p35"/>
+          <p:cNvPr id="259" name="Google Shape;259;p35"/>
           <p:cNvSpPr txBox="1"/>
           <p:nvPr/>
         </p:nvSpPr>
@@ -17801,7 +17603,7 @@
       </p:sp>
       <p:pic>
         <p:nvPicPr>
-          <p:cNvPr id="264" name="Google Shape;264;p35"/>
+          <p:cNvPr id="260" name="Google Shape;260;p35"/>
           <p:cNvPicPr preferRelativeResize="0"/>
           <p:nvPr/>
         </p:nvPicPr>
@@ -17828,7 +17630,7 @@
       </p:pic>
       <p:pic>
         <p:nvPicPr>
-          <p:cNvPr id="265" name="Google Shape;265;p35"/>
+          <p:cNvPr id="261" name="Google Shape;261;p35"/>
           <p:cNvPicPr preferRelativeResize="0"/>
           <p:nvPr/>
         </p:nvPicPr>
@@ -17855,7 +17657,7 @@
       </p:pic>
       <p:sp>
         <p:nvSpPr>
-          <p:cNvPr id="266" name="Google Shape;266;p35"/>
+          <p:cNvPr id="262" name="Google Shape;262;p35"/>
           <p:cNvSpPr txBox="1"/>
           <p:nvPr/>
         </p:nvSpPr>
@@ -17907,7 +17709,7 @@
       </p:sp>
       <p:sp>
         <p:nvSpPr>
-          <p:cNvPr id="267" name="Google Shape;267;p35"/>
+          <p:cNvPr id="263" name="Google Shape;263;p35"/>
           <p:cNvSpPr txBox="1"/>
           <p:nvPr/>
         </p:nvSpPr>
@@ -17941,7 +17743,14 @@
             </a:pPr>
             <a:r>
               <a:rPr lang="en-GB" sz="1800"/>
-              <a:t>Az a “pici” különbség 2019-ben ott nagyságrendileg 50 000 szavazat, más pártok is részesülnek a plusznak tűnő szavazatokból, de ebben az évben szinte egyértelműen a Momentum volt a favorit. (De ne kövezze meg senki! Később több infó is következik …)</a:t>
+              <a:t>Az a “pici” különbség 2019-ben ott nagyságrendileg</a:t>
+            </a:r>
+            <a:br>
+              <a:rPr lang="en-GB" sz="1800"/>
+            </a:br>
+            <a:r>
+              <a:rPr lang="en-GB" sz="1800"/>
+              <a:t>50 000 szavazat, más pártok is részesülnek a plusznak tűnő szavazatokból, de ebben az évben szinte egyértelműen a Momentum volt a favorit. (De ne kövezze meg senki! Később több infó is következik …)</a:t>
             </a:r>
             <a:endParaRPr b="0" sz="1800" strike="noStrike">
               <a:latin typeface="Arial"/>
@@ -17965,7 +17774,7 @@
   <p:cSld>
     <p:spTree>
       <p:nvGrpSpPr>
-        <p:cNvPr id="271" name="Shape 271"/>
+        <p:cNvPr id="267" name="Shape 267"/>
         <p:cNvGrpSpPr/>
         <p:nvPr/>
       </p:nvGrpSpPr>
@@ -17979,7 +17788,7 @@
       </p:grpSpPr>
       <p:sp>
         <p:nvSpPr>
-          <p:cNvPr id="272" name="Google Shape;272;p36"/>
+          <p:cNvPr id="268" name="Google Shape;268;p36"/>
           <p:cNvSpPr txBox="1"/>
           <p:nvPr/>
         </p:nvSpPr>
@@ -18052,7 +17861,7 @@
       </p:sp>
       <p:sp>
         <p:nvSpPr>
-          <p:cNvPr id="273" name="Google Shape;273;p36"/>
+          <p:cNvPr id="269" name="Google Shape;269;p36"/>
           <p:cNvSpPr txBox="1"/>
           <p:nvPr/>
         </p:nvSpPr>
@@ -18099,7 +17908,7 @@
       </p:sp>
       <p:sp>
         <p:nvSpPr>
-          <p:cNvPr id="274" name="Google Shape;274;p36"/>
+          <p:cNvPr id="270" name="Google Shape;270;p36"/>
           <p:cNvSpPr txBox="1"/>
           <p:nvPr/>
         </p:nvSpPr>
@@ -18155,7 +17964,7 @@
       </p:sp>
       <p:sp>
         <p:nvSpPr>
-          <p:cNvPr id="275" name="Google Shape;275;p36"/>
+          <p:cNvPr id="271" name="Google Shape;271;p36"/>
           <p:cNvSpPr txBox="1"/>
           <p:nvPr/>
         </p:nvSpPr>
@@ -18207,7 +18016,7 @@
       </p:sp>
       <p:sp>
         <p:nvSpPr>
-          <p:cNvPr id="276" name="Google Shape;276;p36"/>
+          <p:cNvPr id="272" name="Google Shape;272;p36"/>
           <p:cNvSpPr txBox="1"/>
           <p:nvPr/>
         </p:nvSpPr>
@@ -18259,7 +18068,7 @@
       </p:sp>
       <p:pic>
         <p:nvPicPr>
-          <p:cNvPr id="277" name="Google Shape;277;p36"/>
+          <p:cNvPr id="273" name="Google Shape;273;p36"/>
           <p:cNvPicPr preferRelativeResize="0"/>
           <p:nvPr/>
         </p:nvPicPr>
@@ -18286,7 +18095,7 @@
       </p:pic>
       <p:pic>
         <p:nvPicPr>
-          <p:cNvPr id="278" name="Google Shape;278;p36"/>
+          <p:cNvPr id="274" name="Google Shape;274;p36"/>
           <p:cNvPicPr preferRelativeResize="0"/>
           <p:nvPr/>
         </p:nvPicPr>
@@ -18313,7 +18122,7 @@
       </p:pic>
       <p:pic>
         <p:nvPicPr>
-          <p:cNvPr id="279" name="Google Shape;279;p36"/>
+          <p:cNvPr id="275" name="Google Shape;275;p36"/>
           <p:cNvPicPr preferRelativeResize="0"/>
           <p:nvPr/>
         </p:nvPicPr>
@@ -18340,7 +18149,7 @@
       </p:pic>
       <p:sp>
         <p:nvSpPr>
-          <p:cNvPr id="280" name="Google Shape;280;p36"/>
+          <p:cNvPr id="276" name="Google Shape;276;p36"/>
           <p:cNvSpPr txBox="1"/>
           <p:nvPr/>
         </p:nvSpPr>
@@ -18403,7 +18212,7 @@
   <p:cSld>
     <p:spTree>
       <p:nvGrpSpPr>
-        <p:cNvPr id="284" name="Shape 284"/>
+        <p:cNvPr id="280" name="Shape 280"/>
         <p:cNvGrpSpPr/>
         <p:nvPr/>
       </p:nvGrpSpPr>
@@ -18417,7 +18226,7 @@
       </p:grpSpPr>
       <p:sp>
         <p:nvSpPr>
-          <p:cNvPr id="285" name="Google Shape;285;p37"/>
+          <p:cNvPr id="281" name="Google Shape;281;p37"/>
           <p:cNvSpPr txBox="1"/>
           <p:nvPr/>
         </p:nvSpPr>
@@ -18499,106 +18308,7 @@
       </p:sp>
       <p:sp>
         <p:nvSpPr>
-          <p:cNvPr id="286" name="Google Shape;286;p37"/>
-          <p:cNvSpPr txBox="1"/>
-          <p:nvPr/>
-        </p:nvSpPr>
-        <p:spPr>
-          <a:xfrm>
-            <a:off x="5562600" y="4419600"/>
-            <a:ext cx="1944000" cy="346200"/>
-          </a:xfrm>
-          <a:prstGeom prst="rect">
-            <a:avLst/>
-          </a:prstGeom>
-          <a:noFill/>
-          <a:ln>
-            <a:noFill/>
-          </a:ln>
-        </p:spPr>
-        <p:txBody>
-          <a:bodyPr anchorCtr="0" anchor="t" bIns="45000" lIns="90000" spcFirstLastPara="1" rIns="90000" wrap="square" tIns="45000">
-            <a:noAutofit/>
-          </a:bodyPr>
-          <a:lstStyle/>
-          <a:p>
-            <a:pPr indent="0" lvl="0" marL="0" marR="0" rtl="0" algn="l">
-              <a:spcBef>
-                <a:spcPts val="0"/>
-              </a:spcBef>
-              <a:spcAft>
-                <a:spcPts val="0"/>
-              </a:spcAft>
-              <a:buNone/>
-            </a:pPr>
-            <a:r>
-              <a:rPr lang="en-GB" sz="1800"/>
-              <a:t>“Kerek” + Ferde</a:t>
-            </a:r>
-            <a:endParaRPr b="0" sz="1800" strike="noStrike">
-              <a:latin typeface="Arial"/>
-              <a:ea typeface="Arial"/>
-              <a:cs typeface="Arial"/>
-              <a:sym typeface="Arial"/>
-            </a:endParaRPr>
-          </a:p>
-        </p:txBody>
-      </p:sp>
-      <p:sp>
-        <p:nvSpPr>
-          <p:cNvPr id="287" name="Google Shape;287;p37"/>
-          <p:cNvSpPr txBox="1"/>
-          <p:nvPr/>
-        </p:nvSpPr>
-        <p:spPr>
-          <a:xfrm>
-            <a:off x="8001000" y="4419600"/>
-            <a:ext cx="1486800" cy="381000"/>
-          </a:xfrm>
-          <a:prstGeom prst="rect">
-            <a:avLst/>
-          </a:prstGeom>
-          <a:noFill/>
-          <a:ln>
-            <a:noFill/>
-          </a:ln>
-        </p:spPr>
-        <p:txBody>
-          <a:bodyPr anchorCtr="0" anchor="t" bIns="45000" lIns="90000" spcFirstLastPara="1" rIns="90000" wrap="square" tIns="45000">
-            <a:noAutofit/>
-          </a:bodyPr>
-          <a:lstStyle/>
-          <a:p>
-            <a:pPr indent="0" lvl="0" marL="0" marR="0" rtl="0" algn="l">
-              <a:spcBef>
-                <a:spcPts val="0"/>
-              </a:spcBef>
-              <a:spcAft>
-                <a:spcPts val="0"/>
-              </a:spcAft>
-              <a:buNone/>
-            </a:pPr>
-            <a:r>
-              <a:rPr b="0" lang="en-GB" sz="1800" strike="noStrike">
-                <a:latin typeface="Arial"/>
-                <a:ea typeface="Arial"/>
-                <a:cs typeface="Arial"/>
-                <a:sym typeface="Arial"/>
-              </a:rPr>
-              <a:t>Egész kerek</a:t>
-            </a:r>
-            <a:endParaRPr b="0" sz="1800" strike="noStrike">
-              <a:latin typeface="Arial"/>
-              <a:ea typeface="Arial"/>
-              <a:cs typeface="Arial"/>
-              <a:sym typeface="Arial"/>
-            </a:endParaRPr>
-          </a:p>
-        </p:txBody>
-      </p:sp>
-      <p:sp>
-        <p:nvSpPr>
-          <p:cNvPr id="288" name="Google Shape;288;p37"/>
+          <p:cNvPr id="282" name="Google Shape;282;p37"/>
           <p:cNvSpPr txBox="1"/>
           <p:nvPr/>
         </p:nvSpPr>
@@ -18654,7 +18364,7 @@
       </p:sp>
       <p:sp>
         <p:nvSpPr>
-          <p:cNvPr id="289" name="Google Shape;289;p37"/>
+          <p:cNvPr id="283" name="Google Shape;283;p37"/>
           <p:cNvSpPr txBox="1"/>
           <p:nvPr/>
         </p:nvSpPr>
@@ -18706,7 +18416,7 @@
       </p:sp>
       <p:sp>
         <p:nvSpPr>
-          <p:cNvPr id="290" name="Google Shape;290;p37"/>
+          <p:cNvPr id="284" name="Google Shape;284;p37"/>
           <p:cNvSpPr txBox="1"/>
           <p:nvPr/>
         </p:nvSpPr>
@@ -18758,7 +18468,7 @@
       </p:sp>
       <p:pic>
         <p:nvPicPr>
-          <p:cNvPr id="291" name="Google Shape;291;p37"/>
+          <p:cNvPr id="285" name="Google Shape;285;p37"/>
           <p:cNvPicPr preferRelativeResize="0"/>
           <p:nvPr/>
         </p:nvPicPr>
@@ -18785,7 +18495,7 @@
       </p:pic>
       <p:pic>
         <p:nvPicPr>
-          <p:cNvPr id="292" name="Google Shape;292;p37"/>
+          <p:cNvPr id="286" name="Google Shape;286;p37"/>
           <p:cNvPicPr preferRelativeResize="0"/>
           <p:nvPr/>
         </p:nvPicPr>
@@ -18812,7 +18522,7 @@
       </p:pic>
       <p:pic>
         <p:nvPicPr>
-          <p:cNvPr id="293" name="Google Shape;293;p37"/>
+          <p:cNvPr id="287" name="Google Shape;287;p37"/>
           <p:cNvPicPr preferRelativeResize="0"/>
           <p:nvPr/>
         </p:nvPicPr>
@@ -18839,7 +18549,7 @@
       </p:pic>
       <p:sp>
         <p:nvSpPr>
-          <p:cNvPr id="294" name="Google Shape;294;p37"/>
+          <p:cNvPr id="288" name="Google Shape;288;p37"/>
           <p:cNvSpPr txBox="1"/>
           <p:nvPr/>
         </p:nvSpPr>
@@ -18891,7 +18601,7 @@
       </p:sp>
       <p:sp>
         <p:nvSpPr>
-          <p:cNvPr id="295" name="Google Shape;295;p37"/>
+          <p:cNvPr id="289" name="Google Shape;289;p37"/>
           <p:cNvSpPr txBox="1"/>
           <p:nvPr/>
         </p:nvSpPr>
@@ -18949,7 +18659,7 @@
   <p:cSld>
     <p:spTree>
       <p:nvGrpSpPr>
-        <p:cNvPr id="299" name="Shape 299"/>
+        <p:cNvPr id="293" name="Shape 293"/>
         <p:cNvGrpSpPr/>
         <p:nvPr/>
       </p:nvGrpSpPr>
@@ -18963,7 +18673,7 @@
       </p:grpSpPr>
       <p:sp>
         <p:nvSpPr>
-          <p:cNvPr id="300" name="Google Shape;300;p38"/>
+          <p:cNvPr id="294" name="Google Shape;294;p38"/>
           <p:cNvSpPr txBox="1"/>
           <p:nvPr/>
         </p:nvSpPr>
@@ -19036,7 +18746,7 @@
       </p:sp>
       <p:sp>
         <p:nvSpPr>
-          <p:cNvPr id="301" name="Google Shape;301;p38"/>
+          <p:cNvPr id="295" name="Google Shape;295;p38"/>
           <p:cNvSpPr txBox="1"/>
           <p:nvPr/>
         </p:nvSpPr>
@@ -19092,7 +18802,7 @@
       </p:sp>
       <p:sp>
         <p:nvSpPr>
-          <p:cNvPr id="302" name="Google Shape;302;p38"/>
+          <p:cNvPr id="296" name="Google Shape;296;p38"/>
           <p:cNvSpPr txBox="1"/>
           <p:nvPr/>
         </p:nvSpPr>
@@ -19144,7 +18854,7 @@
       </p:sp>
       <p:sp>
         <p:nvSpPr>
-          <p:cNvPr id="303" name="Google Shape;303;p38"/>
+          <p:cNvPr id="297" name="Google Shape;297;p38"/>
           <p:cNvSpPr txBox="1"/>
           <p:nvPr/>
         </p:nvSpPr>
@@ -19196,7 +18906,7 @@
       </p:sp>
       <p:pic>
         <p:nvPicPr>
-          <p:cNvPr id="304" name="Google Shape;304;p38"/>
+          <p:cNvPr id="298" name="Google Shape;298;p38"/>
           <p:cNvPicPr preferRelativeResize="0"/>
           <p:nvPr/>
         </p:nvPicPr>
@@ -19223,7 +18933,7 @@
       </p:pic>
       <p:pic>
         <p:nvPicPr>
-          <p:cNvPr id="305" name="Google Shape;305;p38"/>
+          <p:cNvPr id="299" name="Google Shape;299;p38"/>
           <p:cNvPicPr preferRelativeResize="0"/>
           <p:nvPr/>
         </p:nvPicPr>
@@ -19250,7 +18960,7 @@
       </p:pic>
       <p:pic>
         <p:nvPicPr>
-          <p:cNvPr id="306" name="Google Shape;306;p38"/>
+          <p:cNvPr id="300" name="Google Shape;300;p38"/>
           <p:cNvPicPr preferRelativeResize="0"/>
           <p:nvPr/>
         </p:nvPicPr>
@@ -19277,7 +18987,7 @@
       </p:pic>
       <p:sp>
         <p:nvSpPr>
-          <p:cNvPr id="307" name="Google Shape;307;p38"/>
+          <p:cNvPr id="301" name="Google Shape;301;p38"/>
           <p:cNvSpPr txBox="1"/>
           <p:nvPr/>
         </p:nvSpPr>
@@ -19329,7 +19039,7 @@
       </p:sp>
       <p:sp>
         <p:nvSpPr>
-          <p:cNvPr id="308" name="Google Shape;308;p38"/>
+          <p:cNvPr id="302" name="Google Shape;302;p38"/>
           <p:cNvSpPr txBox="1"/>
           <p:nvPr/>
         </p:nvSpPr>
@@ -19376,7 +19086,7 @@
       </p:sp>
       <p:sp>
         <p:nvSpPr>
-          <p:cNvPr id="309" name="Google Shape;309;p38"/>
+          <p:cNvPr id="303" name="Google Shape;303;p38"/>
           <p:cNvSpPr txBox="1"/>
           <p:nvPr/>
         </p:nvSpPr>
@@ -19460,7 +19170,7 @@
   <p:cSld>
     <p:spTree>
       <p:nvGrpSpPr>
-        <p:cNvPr id="313" name="Shape 313"/>
+        <p:cNvPr id="307" name="Shape 307"/>
         <p:cNvGrpSpPr/>
         <p:nvPr/>
       </p:nvGrpSpPr>
@@ -19474,7 +19184,7 @@
       </p:grpSpPr>
       <p:sp>
         <p:nvSpPr>
-          <p:cNvPr id="314" name="Google Shape;314;p39"/>
+          <p:cNvPr id="308" name="Google Shape;308;p39"/>
           <p:cNvSpPr txBox="1"/>
           <p:nvPr/>
         </p:nvSpPr>
@@ -19547,7 +19257,7 @@
       </p:sp>
       <p:sp>
         <p:nvSpPr>
-          <p:cNvPr id="315" name="Google Shape;315;p39"/>
+          <p:cNvPr id="309" name="Google Shape;309;p39"/>
           <p:cNvSpPr txBox="1"/>
           <p:nvPr/>
         </p:nvSpPr>
@@ -19603,7 +19313,7 @@
       </p:sp>
       <p:sp>
         <p:nvSpPr>
-          <p:cNvPr id="316" name="Google Shape;316;p39"/>
+          <p:cNvPr id="310" name="Google Shape;310;p39"/>
           <p:cNvSpPr txBox="1"/>
           <p:nvPr/>
         </p:nvSpPr>
@@ -19655,7 +19365,7 @@
       </p:sp>
       <p:sp>
         <p:nvSpPr>
-          <p:cNvPr id="317" name="Google Shape;317;p39"/>
+          <p:cNvPr id="311" name="Google Shape;311;p39"/>
           <p:cNvSpPr txBox="1"/>
           <p:nvPr/>
         </p:nvSpPr>
@@ -19707,7 +19417,7 @@
       </p:sp>
       <p:pic>
         <p:nvPicPr>
-          <p:cNvPr id="318" name="Google Shape;318;p39"/>
+          <p:cNvPr id="312" name="Google Shape;312;p39"/>
           <p:cNvPicPr preferRelativeResize="0"/>
           <p:nvPr/>
         </p:nvPicPr>
@@ -19734,7 +19444,7 @@
       </p:pic>
       <p:pic>
         <p:nvPicPr>
-          <p:cNvPr id="319" name="Google Shape;319;p39"/>
+          <p:cNvPr id="313" name="Google Shape;313;p39"/>
           <p:cNvPicPr preferRelativeResize="0"/>
           <p:nvPr/>
         </p:nvPicPr>
@@ -19761,7 +19471,7 @@
       </p:pic>
       <p:pic>
         <p:nvPicPr>
-          <p:cNvPr id="320" name="Google Shape;320;p39"/>
+          <p:cNvPr id="314" name="Google Shape;314;p39"/>
           <p:cNvPicPr preferRelativeResize="0"/>
           <p:nvPr/>
         </p:nvPicPr>
@@ -19788,7 +19498,7 @@
       </p:pic>
       <p:sp>
         <p:nvSpPr>
-          <p:cNvPr id="321" name="Google Shape;321;p39"/>
+          <p:cNvPr id="315" name="Google Shape;315;p39"/>
           <p:cNvSpPr txBox="1"/>
           <p:nvPr/>
         </p:nvSpPr>
@@ -19840,7 +19550,7 @@
       </p:sp>
       <p:pic>
         <p:nvPicPr>
-          <p:cNvPr id="322" name="Google Shape;322;p39"/>
+          <p:cNvPr id="316" name="Google Shape;316;p39"/>
           <p:cNvPicPr preferRelativeResize="0"/>
           <p:nvPr/>
         </p:nvPicPr>
@@ -19878,7 +19588,7 @@
   <p:cSld>
     <p:spTree>
       <p:nvGrpSpPr>
-        <p:cNvPr id="326" name="Shape 326"/>
+        <p:cNvPr id="320" name="Shape 320"/>
         <p:cNvGrpSpPr/>
         <p:nvPr/>
       </p:nvGrpSpPr>
@@ -19892,7 +19602,7 @@
       </p:grpSpPr>
       <p:sp>
         <p:nvSpPr>
-          <p:cNvPr id="327" name="Google Shape;327;p40"/>
+          <p:cNvPr id="321" name="Google Shape;321;p40"/>
           <p:cNvSpPr txBox="1"/>
           <p:nvPr/>
         </p:nvSpPr>
@@ -19974,7 +19684,7 @@
       </p:sp>
       <p:sp>
         <p:nvSpPr>
-          <p:cNvPr id="328" name="Google Shape;328;p40"/>
+          <p:cNvPr id="322" name="Google Shape;322;p40"/>
           <p:cNvSpPr txBox="1"/>
           <p:nvPr/>
         </p:nvSpPr>
@@ -20030,7 +19740,7 @@
       </p:sp>
       <p:sp>
         <p:nvSpPr>
-          <p:cNvPr id="329" name="Google Shape;329;p40"/>
+          <p:cNvPr id="323" name="Google Shape;323;p40"/>
           <p:cNvSpPr txBox="1"/>
           <p:nvPr/>
         </p:nvSpPr>
@@ -20082,7 +19792,7 @@
       </p:sp>
       <p:sp>
         <p:nvSpPr>
-          <p:cNvPr id="330" name="Google Shape;330;p40"/>
+          <p:cNvPr id="324" name="Google Shape;324;p40"/>
           <p:cNvSpPr txBox="1"/>
           <p:nvPr/>
         </p:nvSpPr>
@@ -20134,7 +19844,7 @@
       </p:sp>
       <p:pic>
         <p:nvPicPr>
-          <p:cNvPr id="331" name="Google Shape;331;p40"/>
+          <p:cNvPr id="325" name="Google Shape;325;p40"/>
           <p:cNvPicPr preferRelativeResize="0"/>
           <p:nvPr/>
         </p:nvPicPr>
@@ -20161,7 +19871,7 @@
       </p:pic>
       <p:pic>
         <p:nvPicPr>
-          <p:cNvPr id="332" name="Google Shape;332;p40"/>
+          <p:cNvPr id="326" name="Google Shape;326;p40"/>
           <p:cNvPicPr preferRelativeResize="0"/>
           <p:nvPr/>
         </p:nvPicPr>
@@ -20188,7 +19898,7 @@
       </p:pic>
       <p:pic>
         <p:nvPicPr>
-          <p:cNvPr id="333" name="Google Shape;333;p40"/>
+          <p:cNvPr id="327" name="Google Shape;327;p40"/>
           <p:cNvPicPr preferRelativeResize="0"/>
           <p:nvPr/>
         </p:nvPicPr>
@@ -20215,7 +19925,7 @@
       </p:pic>
       <p:sp>
         <p:nvSpPr>
-          <p:cNvPr id="334" name="Google Shape;334;p40"/>
+          <p:cNvPr id="328" name="Google Shape;328;p40"/>
           <p:cNvSpPr txBox="1"/>
           <p:nvPr/>
         </p:nvSpPr>
@@ -20267,7 +19977,7 @@
       </p:sp>
       <p:pic>
         <p:nvPicPr>
-          <p:cNvPr id="335" name="Google Shape;335;p40"/>
+          <p:cNvPr id="329" name="Google Shape;329;p40"/>
           <p:cNvPicPr preferRelativeResize="0"/>
           <p:nvPr/>
         </p:nvPicPr>
@@ -20305,7 +20015,7 @@
   <p:cSld>
     <p:spTree>
       <p:nvGrpSpPr>
-        <p:cNvPr id="339" name="Shape 339"/>
+        <p:cNvPr id="333" name="Shape 333"/>
         <p:cNvGrpSpPr/>
         <p:nvPr/>
       </p:nvGrpSpPr>
@@ -20319,7 +20029,7 @@
       </p:grpSpPr>
       <p:sp>
         <p:nvSpPr>
-          <p:cNvPr id="340" name="Google Shape;340;p41"/>
+          <p:cNvPr id="334" name="Google Shape;334;p41"/>
           <p:cNvSpPr txBox="1"/>
           <p:nvPr/>
         </p:nvSpPr>
@@ -20392,7 +20102,7 @@
       </p:sp>
       <p:sp>
         <p:nvSpPr>
-          <p:cNvPr id="341" name="Google Shape;341;p41"/>
+          <p:cNvPr id="335" name="Google Shape;335;p41"/>
           <p:cNvSpPr txBox="1"/>
           <p:nvPr/>
         </p:nvSpPr>
@@ -20448,7 +20158,7 @@
       </p:sp>
       <p:sp>
         <p:nvSpPr>
-          <p:cNvPr id="342" name="Google Shape;342;p41"/>
+          <p:cNvPr id="336" name="Google Shape;336;p41"/>
           <p:cNvSpPr txBox="1"/>
           <p:nvPr/>
         </p:nvSpPr>
@@ -20500,7 +20210,7 @@
       </p:sp>
       <p:sp>
         <p:nvSpPr>
-          <p:cNvPr id="343" name="Google Shape;343;p41"/>
+          <p:cNvPr id="337" name="Google Shape;337;p41"/>
           <p:cNvSpPr txBox="1"/>
           <p:nvPr/>
         </p:nvSpPr>
@@ -20552,7 +20262,7 @@
       </p:sp>
       <p:pic>
         <p:nvPicPr>
-          <p:cNvPr id="344" name="Google Shape;344;p41"/>
+          <p:cNvPr id="338" name="Google Shape;338;p41"/>
           <p:cNvPicPr preferRelativeResize="0"/>
           <p:nvPr/>
         </p:nvPicPr>
@@ -20579,7 +20289,7 @@
       </p:pic>
       <p:pic>
         <p:nvPicPr>
-          <p:cNvPr id="345" name="Google Shape;345;p41"/>
+          <p:cNvPr id="339" name="Google Shape;339;p41"/>
           <p:cNvPicPr preferRelativeResize="0"/>
           <p:nvPr/>
         </p:nvPicPr>
@@ -20606,7 +20316,7 @@
       </p:pic>
       <p:pic>
         <p:nvPicPr>
-          <p:cNvPr id="346" name="Google Shape;346;p41"/>
+          <p:cNvPr id="340" name="Google Shape;340;p41"/>
           <p:cNvPicPr preferRelativeResize="0"/>
           <p:nvPr/>
         </p:nvPicPr>
@@ -20633,7 +20343,7 @@
       </p:pic>
       <p:sp>
         <p:nvSpPr>
-          <p:cNvPr id="347" name="Google Shape;347;p41"/>
+          <p:cNvPr id="341" name="Google Shape;341;p41"/>
           <p:cNvSpPr txBox="1"/>
           <p:nvPr/>
         </p:nvSpPr>
@@ -20685,7 +20395,7 @@
       </p:sp>
       <p:pic>
         <p:nvPicPr>
-          <p:cNvPr id="348" name="Google Shape;348;p41"/>
+          <p:cNvPr id="342" name="Google Shape;342;p41"/>
           <p:cNvPicPr preferRelativeResize="0"/>
           <p:nvPr/>
         </p:nvPicPr>
@@ -20712,7 +20422,7 @@
       </p:pic>
       <p:sp>
         <p:nvSpPr>
-          <p:cNvPr id="349" name="Google Shape;349;p41"/>
+          <p:cNvPr id="343" name="Google Shape;343;p41"/>
           <p:cNvSpPr txBox="1"/>
           <p:nvPr/>
         </p:nvSpPr>
@@ -20755,7 +20465,20 @@
                 <a:cs typeface="Arial"/>
                 <a:sym typeface="Arial"/>
               </a:rPr>
-              <a:t>2014-ben és 2018-ban mintha el lenne húzva, (mintha a jobb </a:t>
+              <a:t>2014-ben és 2018-ban mintha fel lenne húzv</a:t>
+            </a:r>
+            <a:r>
+              <a:rPr lang="en-GB" sz="1800"/>
+              <a:t>a</a:t>
+            </a:r>
+            <a:r>
+              <a:rPr b="0" lang="en-GB" sz="1800" strike="noStrike">
+                <a:latin typeface="Arial"/>
+                <a:ea typeface="Arial"/>
+                <a:cs typeface="Arial"/>
+                <a:sym typeface="Arial"/>
+              </a:rPr>
+              <a:t> (mintha a jobb </a:t>
             </a:r>
             <a:r>
               <a:rPr b="1" lang="en-GB" sz="1800" strike="noStrike">
@@ -20773,7 +20496,7 @@
                 <a:cs typeface="Arial"/>
                 <a:sym typeface="Arial"/>
               </a:rPr>
-              <a:t> sarok felé tolódna a súlypont)</a:t>
+              <a:t> sarok felé tolódna a súlypont), de</a:t>
             </a:r>
             <a:r>
               <a:rPr lang="en-GB" sz="1800">
@@ -20781,7 +20504,7 @@
                   <a:schemeClr val="dk1"/>
                 </a:solidFill>
               </a:rPr>
-              <a:t>, 2019-ben már nem látszik favorizáltnak.</a:t>
+              <a:t> 2019-ben már nem látszik favorizáltnak.</a:t>
             </a:r>
             <a:endParaRPr b="0" sz="1800" strike="noStrike">
               <a:latin typeface="Arial"/>
@@ -20805,7 +20528,7 @@
   <p:cSld>
     <p:spTree>
       <p:nvGrpSpPr>
-        <p:cNvPr id="353" name="Shape 353"/>
+        <p:cNvPr id="347" name="Shape 347"/>
         <p:cNvGrpSpPr/>
         <p:nvPr/>
       </p:nvGrpSpPr>
@@ -20819,7 +20542,7 @@
       </p:grpSpPr>
       <p:sp>
         <p:nvSpPr>
-          <p:cNvPr id="354" name="Google Shape;354;p42"/>
+          <p:cNvPr id="348" name="Google Shape;348;p42"/>
           <p:cNvSpPr txBox="1"/>
           <p:nvPr/>
         </p:nvSpPr>
@@ -20892,7 +20615,7 @@
       </p:sp>
       <p:sp>
         <p:nvSpPr>
-          <p:cNvPr id="355" name="Google Shape;355;p42"/>
+          <p:cNvPr id="349" name="Google Shape;349;p42"/>
           <p:cNvSpPr txBox="1"/>
           <p:nvPr/>
         </p:nvSpPr>
@@ -20944,7 +20667,7 @@
       </p:sp>
       <p:sp>
         <p:nvSpPr>
-          <p:cNvPr id="356" name="Google Shape;356;p42"/>
+          <p:cNvPr id="350" name="Google Shape;350;p42"/>
           <p:cNvSpPr txBox="1"/>
           <p:nvPr/>
         </p:nvSpPr>
@@ -20996,7 +20719,7 @@
       </p:sp>
       <p:sp>
         <p:nvSpPr>
-          <p:cNvPr id="357" name="Google Shape;357;p42"/>
+          <p:cNvPr id="351" name="Google Shape;351;p42"/>
           <p:cNvSpPr txBox="1"/>
           <p:nvPr/>
         </p:nvSpPr>
@@ -21048,7 +20771,7 @@
       </p:sp>
       <p:pic>
         <p:nvPicPr>
-          <p:cNvPr id="358" name="Google Shape;358;p42"/>
+          <p:cNvPr id="352" name="Google Shape;352;p42"/>
           <p:cNvPicPr preferRelativeResize="0"/>
           <p:nvPr/>
         </p:nvPicPr>
@@ -21075,7 +20798,7 @@
       </p:pic>
       <p:pic>
         <p:nvPicPr>
-          <p:cNvPr id="359" name="Google Shape;359;p42"/>
+          <p:cNvPr id="353" name="Google Shape;353;p42"/>
           <p:cNvPicPr preferRelativeResize="0"/>
           <p:nvPr/>
         </p:nvPicPr>
@@ -21200,7 +20923,20 @@
                 <a:cs typeface="Arial"/>
                 <a:sym typeface="Arial"/>
               </a:rPr>
-              <a:t>A reálisan elvárható sávokon kívül eső értékeket vastagon szedés jelöli.</a:t>
+              <a:t>A reálisan elvárható sávokon kívül eső értékeket </a:t>
+            </a:r>
+            <a:r>
+              <a:rPr b="1" lang="en-GB" sz="1500" strike="noStrike"/>
+              <a:t>vastagon</a:t>
+            </a:r>
+            <a:r>
+              <a:rPr b="0" lang="en-GB" sz="1500" strike="noStrike">
+                <a:latin typeface="Arial"/>
+                <a:ea typeface="Arial"/>
+                <a:cs typeface="Arial"/>
+                <a:sym typeface="Arial"/>
+              </a:rPr>
+              <a:t> szedés jelöli.</a:t>
             </a:r>
             <a:br>
               <a:rPr lang="en-GB" sz="1800"/>
@@ -21707,7 +21443,7 @@
   <p:cSld>
     <p:spTree>
       <p:nvGrpSpPr>
-        <p:cNvPr id="363" name="Shape 363"/>
+        <p:cNvPr id="357" name="Shape 357"/>
         <p:cNvGrpSpPr/>
         <p:nvPr/>
       </p:nvGrpSpPr>
@@ -21721,7 +21457,7 @@
       </p:grpSpPr>
       <p:sp>
         <p:nvSpPr>
-          <p:cNvPr id="364" name="Google Shape;364;p43"/>
+          <p:cNvPr id="358" name="Google Shape;358;p43"/>
           <p:cNvSpPr txBox="1"/>
           <p:nvPr/>
         </p:nvSpPr>
@@ -21803,7 +21539,7 @@
       </p:sp>
       <p:pic>
         <p:nvPicPr>
-          <p:cNvPr id="365" name="Google Shape;365;p43"/>
+          <p:cNvPr id="359" name="Google Shape;359;p43"/>
           <p:cNvPicPr preferRelativeResize="0"/>
           <p:nvPr/>
         </p:nvPicPr>
@@ -21830,7 +21566,7 @@
       </p:pic>
       <p:pic>
         <p:nvPicPr>
-          <p:cNvPr id="366" name="Google Shape;366;p43"/>
+          <p:cNvPr id="360" name="Google Shape;360;p43"/>
           <p:cNvPicPr preferRelativeResize="0"/>
           <p:nvPr/>
         </p:nvPicPr>
@@ -21857,7 +21593,7 @@
       </p:pic>
       <p:sp>
         <p:nvSpPr>
-          <p:cNvPr id="367" name="Google Shape;367;p43"/>
+          <p:cNvPr id="361" name="Google Shape;361;p43"/>
           <p:cNvSpPr txBox="1"/>
           <p:nvPr/>
         </p:nvSpPr>
@@ -21909,7 +21645,7 @@
       </p:sp>
       <p:sp>
         <p:nvSpPr>
-          <p:cNvPr id="368" name="Google Shape;368;p43"/>
+          <p:cNvPr id="362" name="Google Shape;362;p43"/>
           <p:cNvSpPr txBox="1"/>
           <p:nvPr/>
         </p:nvSpPr>
@@ -21961,7 +21697,7 @@
       </p:sp>
       <p:sp>
         <p:nvSpPr>
-          <p:cNvPr id="369" name="Google Shape;369;p43"/>
+          <p:cNvPr id="363" name="Google Shape;363;p43"/>
           <p:cNvSpPr txBox="1"/>
           <p:nvPr/>
         </p:nvSpPr>
@@ -22013,7 +21749,7 @@
       </p:sp>
       <p:sp>
         <p:nvSpPr>
-          <p:cNvPr id="370" name="Google Shape;370;p43"/>
+          <p:cNvPr id="364" name="Google Shape;364;p43"/>
           <p:cNvSpPr txBox="1"/>
           <p:nvPr/>
         </p:nvSpPr>
@@ -22076,7 +21812,7 @@
   <p:cSld>
     <p:spTree>
       <p:nvGrpSpPr>
-        <p:cNvPr id="374" name="Shape 374"/>
+        <p:cNvPr id="368" name="Shape 368"/>
         <p:cNvGrpSpPr/>
         <p:nvPr/>
       </p:nvGrpSpPr>
@@ -22090,7 +21826,7 @@
       </p:grpSpPr>
       <p:sp>
         <p:nvSpPr>
-          <p:cNvPr id="375" name="Google Shape;375;p44"/>
+          <p:cNvPr id="369" name="Google Shape;369;p44"/>
           <p:cNvSpPr txBox="1"/>
           <p:nvPr/>
         </p:nvSpPr>
@@ -22163,7 +21899,7 @@
       </p:sp>
       <p:sp>
         <p:nvSpPr>
-          <p:cNvPr id="376" name="Google Shape;376;p44"/>
+          <p:cNvPr id="370" name="Google Shape;370;p44"/>
           <p:cNvSpPr txBox="1"/>
           <p:nvPr/>
         </p:nvSpPr>
@@ -22219,7 +21955,7 @@
       </p:sp>
       <p:sp>
         <p:nvSpPr>
-          <p:cNvPr id="377" name="Google Shape;377;p44"/>
+          <p:cNvPr id="371" name="Google Shape;371;p44"/>
           <p:cNvSpPr txBox="1"/>
           <p:nvPr/>
         </p:nvSpPr>
@@ -22271,7 +22007,7 @@
       </p:sp>
       <p:sp>
         <p:nvSpPr>
-          <p:cNvPr id="378" name="Google Shape;378;p44"/>
+          <p:cNvPr id="372" name="Google Shape;372;p44"/>
           <p:cNvSpPr txBox="1"/>
           <p:nvPr/>
         </p:nvSpPr>
@@ -22323,7 +22059,7 @@
       </p:sp>
       <p:pic>
         <p:nvPicPr>
-          <p:cNvPr id="379" name="Google Shape;379;p44"/>
+          <p:cNvPr id="373" name="Google Shape;373;p44"/>
           <p:cNvPicPr preferRelativeResize="0"/>
           <p:nvPr/>
         </p:nvPicPr>
@@ -22350,7 +22086,7 @@
       </p:pic>
       <p:pic>
         <p:nvPicPr>
-          <p:cNvPr id="380" name="Google Shape;380;p44"/>
+          <p:cNvPr id="374" name="Google Shape;374;p44"/>
           <p:cNvPicPr preferRelativeResize="0"/>
           <p:nvPr/>
         </p:nvPicPr>
@@ -22377,7 +22113,7 @@
       </p:pic>
       <p:sp>
         <p:nvSpPr>
-          <p:cNvPr id="381" name="Google Shape;381;p44"/>
+          <p:cNvPr id="375" name="Google Shape;375;p44"/>
           <p:cNvSpPr txBox="1"/>
           <p:nvPr/>
         </p:nvSpPr>
@@ -22440,7 +22176,7 @@
   <p:cSld>
     <p:spTree>
       <p:nvGrpSpPr>
-        <p:cNvPr id="385" name="Shape 385"/>
+        <p:cNvPr id="379" name="Shape 379"/>
         <p:cNvGrpSpPr/>
         <p:nvPr/>
       </p:nvGrpSpPr>
@@ -22454,7 +22190,7 @@
       </p:grpSpPr>
       <p:sp>
         <p:nvSpPr>
-          <p:cNvPr id="386" name="Google Shape;386;p45"/>
+          <p:cNvPr id="380" name="Google Shape;380;p45"/>
           <p:cNvSpPr txBox="1"/>
           <p:nvPr/>
         </p:nvSpPr>
@@ -22536,7 +22272,7 @@
       </p:sp>
       <p:sp>
         <p:nvSpPr>
-          <p:cNvPr id="387" name="Google Shape;387;p45"/>
+          <p:cNvPr id="381" name="Google Shape;381;p45"/>
           <p:cNvSpPr txBox="1"/>
           <p:nvPr/>
         </p:nvSpPr>
@@ -22592,7 +22328,7 @@
       </p:sp>
       <p:sp>
         <p:nvSpPr>
-          <p:cNvPr id="388" name="Google Shape;388;p45"/>
+          <p:cNvPr id="382" name="Google Shape;382;p45"/>
           <p:cNvSpPr txBox="1"/>
           <p:nvPr/>
         </p:nvSpPr>
@@ -22644,7 +22380,7 @@
       </p:sp>
       <p:sp>
         <p:nvSpPr>
-          <p:cNvPr id="389" name="Google Shape;389;p45"/>
+          <p:cNvPr id="383" name="Google Shape;383;p45"/>
           <p:cNvSpPr txBox="1"/>
           <p:nvPr/>
         </p:nvSpPr>
@@ -22696,7 +22432,7 @@
       </p:sp>
       <p:pic>
         <p:nvPicPr>
-          <p:cNvPr id="390" name="Google Shape;390;p45"/>
+          <p:cNvPr id="384" name="Google Shape;384;p45"/>
           <p:cNvPicPr preferRelativeResize="0"/>
           <p:nvPr/>
         </p:nvPicPr>
@@ -22723,7 +22459,7 @@
       </p:pic>
       <p:pic>
         <p:nvPicPr>
-          <p:cNvPr id="391" name="Google Shape;391;p45"/>
+          <p:cNvPr id="385" name="Google Shape;385;p45"/>
           <p:cNvPicPr preferRelativeResize="0"/>
           <p:nvPr/>
         </p:nvPicPr>
@@ -22750,7 +22486,7 @@
       </p:pic>
       <p:sp>
         <p:nvSpPr>
-          <p:cNvPr id="392" name="Google Shape;392;p45"/>
+          <p:cNvPr id="386" name="Google Shape;386;p45"/>
           <p:cNvSpPr txBox="1"/>
           <p:nvPr/>
         </p:nvSpPr>
@@ -22813,7 +22549,7 @@
   <p:cSld>
     <p:spTree>
       <p:nvGrpSpPr>
-        <p:cNvPr id="396" name="Shape 396"/>
+        <p:cNvPr id="390" name="Shape 390"/>
         <p:cNvGrpSpPr/>
         <p:nvPr/>
       </p:nvGrpSpPr>
@@ -22827,7 +22563,7 @@
       </p:grpSpPr>
       <p:sp>
         <p:nvSpPr>
-          <p:cNvPr id="397" name="Google Shape;397;p46"/>
+          <p:cNvPr id="391" name="Google Shape;391;p46"/>
           <p:cNvSpPr txBox="1"/>
           <p:nvPr/>
         </p:nvSpPr>
@@ -22900,7 +22636,7 @@
       </p:sp>
       <p:sp>
         <p:nvSpPr>
-          <p:cNvPr id="398" name="Google Shape;398;p46"/>
+          <p:cNvPr id="392" name="Google Shape;392;p46"/>
           <p:cNvSpPr txBox="1"/>
           <p:nvPr/>
         </p:nvSpPr>
@@ -22956,7 +22692,7 @@
       </p:sp>
       <p:sp>
         <p:nvSpPr>
-          <p:cNvPr id="399" name="Google Shape;399;p46"/>
+          <p:cNvPr id="393" name="Google Shape;393;p46"/>
           <p:cNvSpPr txBox="1"/>
           <p:nvPr/>
         </p:nvSpPr>
@@ -23008,7 +22744,7 @@
       </p:sp>
       <p:sp>
         <p:nvSpPr>
-          <p:cNvPr id="400" name="Google Shape;400;p46"/>
+          <p:cNvPr id="394" name="Google Shape;394;p46"/>
           <p:cNvSpPr txBox="1"/>
           <p:nvPr/>
         </p:nvSpPr>
@@ -23060,7 +22796,7 @@
       </p:sp>
       <p:pic>
         <p:nvPicPr>
-          <p:cNvPr id="401" name="Google Shape;401;p46"/>
+          <p:cNvPr id="395" name="Google Shape;395;p46"/>
           <p:cNvPicPr preferRelativeResize="0"/>
           <p:nvPr/>
         </p:nvPicPr>
@@ -23087,7 +22823,7 @@
       </p:pic>
       <p:pic>
         <p:nvPicPr>
-          <p:cNvPr id="402" name="Google Shape;402;p46"/>
+          <p:cNvPr id="396" name="Google Shape;396;p46"/>
           <p:cNvPicPr preferRelativeResize="0"/>
           <p:nvPr/>
         </p:nvPicPr>
@@ -23114,7 +22850,7 @@
       </p:pic>
       <p:sp>
         <p:nvSpPr>
-          <p:cNvPr id="403" name="Google Shape;403;p46"/>
+          <p:cNvPr id="397" name="Google Shape;397;p46"/>
           <p:cNvSpPr txBox="1"/>
           <p:nvPr/>
         </p:nvSpPr>
@@ -23166,7 +22902,7 @@
       </p:sp>
       <p:sp>
         <p:nvSpPr>
-          <p:cNvPr id="404" name="Google Shape;404;p46"/>
+          <p:cNvPr id="398" name="Google Shape;398;p46"/>
           <p:cNvSpPr txBox="1"/>
           <p:nvPr/>
         </p:nvSpPr>
@@ -23200,7 +22936,7 @@
             </a:pPr>
             <a:r>
               <a:rPr lang="en-GB" sz="1800"/>
-              <a:t>2018-ban eléggé olyan, mintha felhúzták volna,</a:t>
+              <a:t>2018-ban eléggé olyan, mintha felhúzták volna, </a:t>
             </a:r>
             <a:r>
               <a:rPr b="0" lang="en-GB" sz="1800" strike="noStrike">
@@ -23250,7 +22986,7 @@
   <p:cSld>
     <p:spTree>
       <p:nvGrpSpPr>
-        <p:cNvPr id="408" name="Shape 408"/>
+        <p:cNvPr id="402" name="Shape 402"/>
         <p:cNvGrpSpPr/>
         <p:nvPr/>
       </p:nvGrpSpPr>
@@ -23264,7 +23000,7 @@
       </p:grpSpPr>
       <p:sp>
         <p:nvSpPr>
-          <p:cNvPr id="409" name="Google Shape;409;p47"/>
+          <p:cNvPr id="403" name="Google Shape;403;p47"/>
           <p:cNvSpPr txBox="1"/>
           <p:nvPr/>
         </p:nvSpPr>
@@ -23329,7 +23065,7 @@
       </p:sp>
       <p:graphicFrame>
         <p:nvGraphicFramePr>
-          <p:cNvPr id="410" name="Google Shape;410;p47"/>
+          <p:cNvPr id="404" name="Google Shape;404;p47"/>
           <p:cNvGraphicFramePr/>
           <p:nvPr/>
         </p:nvGraphicFramePr>
@@ -23342,7 +23078,7 @@
             <a:tbl>
               <a:tblPr>
                 <a:noFill/>
-                <a:tableStyleId>{75D120C3-5C53-4029-85D3-79420072BE69}</a:tableStyleId>
+                <a:tableStyleId>{235616EC-FFBD-48CE-9284-A92EFDE56151}</a:tableStyleId>
               </a:tblPr>
               <a:tblGrid>
                 <a:gridCol w="860325"/>
@@ -28513,7 +28249,7 @@
       </p:graphicFrame>
       <p:sp>
         <p:nvSpPr>
-          <p:cNvPr id="411" name="Google Shape;411;p47"/>
+          <p:cNvPr id="405" name="Google Shape;405;p47"/>
           <p:cNvSpPr txBox="1"/>
           <p:nvPr/>
         </p:nvSpPr>
@@ -28627,7 +28363,7 @@
       </p:sp>
       <p:sp>
         <p:nvSpPr>
-          <p:cNvPr id="412" name="Google Shape;412;p47"/>
+          <p:cNvPr id="406" name="Google Shape;406;p47"/>
           <p:cNvSpPr txBox="1"/>
           <p:nvPr/>
         </p:nvSpPr>
@@ -28679,7 +28415,7 @@
       </p:sp>
       <p:sp>
         <p:nvSpPr>
-          <p:cNvPr id="413" name="Google Shape;413;p47"/>
+          <p:cNvPr id="407" name="Google Shape;407;p47"/>
           <p:cNvSpPr txBox="1"/>
           <p:nvPr/>
         </p:nvSpPr>
@@ -28779,7 +28515,7 @@
       </p:sp>
       <p:sp>
         <p:nvSpPr>
-          <p:cNvPr id="414" name="Google Shape;414;p47"/>
+          <p:cNvPr id="408" name="Google Shape;408;p47"/>
           <p:cNvSpPr txBox="1"/>
           <p:nvPr/>
         </p:nvSpPr>
@@ -28864,7 +28600,7 @@
   <p:cSld>
     <p:spTree>
       <p:nvGrpSpPr>
-        <p:cNvPr id="418" name="Shape 418"/>
+        <p:cNvPr id="412" name="Shape 412"/>
         <p:cNvGrpSpPr/>
         <p:nvPr/>
       </p:nvGrpSpPr>
@@ -28878,7 +28614,7 @@
       </p:grpSpPr>
       <p:sp>
         <p:nvSpPr>
-          <p:cNvPr id="419" name="Google Shape;419;p48"/>
+          <p:cNvPr id="413" name="Google Shape;413;p48"/>
           <p:cNvSpPr txBox="1"/>
           <p:nvPr/>
         </p:nvSpPr>
@@ -28934,7 +28670,7 @@
       </p:sp>
       <p:sp>
         <p:nvSpPr>
-          <p:cNvPr id="420" name="Google Shape;420;p48"/>
+          <p:cNvPr id="414" name="Google Shape;414;p48"/>
           <p:cNvSpPr txBox="1"/>
           <p:nvPr/>
         </p:nvSpPr>
@@ -29007,7 +28743,7 @@
             </a:r>
             <a:r>
               <a:rPr lang="en-GB" sz="1500"/>
-              <a:t>en itt még sokkal kisebb a vizuális különbség. A csalóka látszat ellenére ezek az “apró különbségek” több százezer (150-220 ezres nagyságrend) szavazattal bíró szavazókör csoportot takarnak, csupán a Fideszre leadottakat </a:t>
+              <a:t>en ekkor még sokkal kisebb a vizuális különbség. A csalóka látszat ellenére ezek az “apró különbségek” több százezer (150-220 ezres nagyságrend) szavazattal bíró szavazókör csoportot takarnak, csupán a Fideszre leadottakat </a:t>
             </a:r>
             <a:r>
               <a:rPr lang="en-GB" sz="1500">
@@ -29082,11 +28818,72 @@
                 <a:cs typeface="Arial"/>
                 <a:sym typeface="Arial"/>
               </a:rPr>
-              <a:t>Nagyon erősen a Fidesz, és valamivel kevésbé, de a DK is kaphatott (ezekből) a plusz szavazatokból. Az MSZP pakett-tölteléknek tűnik. A Fidesz még így sem üti meg az országos átlagát, talán ezek nem igazán fidesz-barát területek. </a:t>
+              <a:t>Nagyon erősen a Fidesz, </a:t>
             </a:r>
             <a:r>
               <a:rPr lang="en-GB" sz="1500"/>
-              <a:t>Nyertes a Momentum is.</a:t>
+              <a:t>jól jár a Momentum, </a:t>
+            </a:r>
+            <a:r>
+              <a:rPr b="0" lang="en-GB" sz="1500" strike="noStrike">
+                <a:latin typeface="Arial"/>
+                <a:ea typeface="Arial"/>
+                <a:cs typeface="Arial"/>
+                <a:sym typeface="Arial"/>
+              </a:rPr>
+              <a:t>és valamivel kevésbé, de a DK</a:t>
+            </a:r>
+            <a:r>
+              <a:rPr lang="en-GB" sz="1500"/>
+              <a:t> és</a:t>
+            </a:r>
+            <a:r>
+              <a:rPr b="0" lang="en-GB" sz="1500" strike="noStrike">
+                <a:latin typeface="Arial"/>
+                <a:ea typeface="Arial"/>
+                <a:cs typeface="Arial"/>
+                <a:sym typeface="Arial"/>
+              </a:rPr>
+              <a:t> a</a:t>
+            </a:r>
+            <a:r>
+              <a:rPr lang="en-GB" sz="1500"/>
+              <a:t>z MSZP is</a:t>
+            </a:r>
+            <a:r>
+              <a:rPr b="0" lang="en-GB" sz="1500" strike="noStrike">
+                <a:latin typeface="Arial"/>
+                <a:ea typeface="Arial"/>
+                <a:cs typeface="Arial"/>
+                <a:sym typeface="Arial"/>
+              </a:rPr>
+              <a:t> a plusz szavazatok</a:t>
+            </a:r>
+            <a:r>
+              <a:rPr lang="en-GB" sz="1500"/>
+              <a:t> kapcsán</a:t>
+            </a:r>
+            <a:r>
+              <a:rPr b="0" lang="en-GB" sz="1500" strike="noStrike">
+                <a:latin typeface="Arial"/>
+                <a:ea typeface="Arial"/>
+                <a:cs typeface="Arial"/>
+                <a:sym typeface="Arial"/>
+              </a:rPr>
+              <a:t>.</a:t>
+            </a:r>
+            <a:r>
+              <a:rPr b="0" lang="en-GB" sz="1500" strike="noStrike">
+                <a:latin typeface="Arial"/>
+                <a:ea typeface="Arial"/>
+                <a:cs typeface="Arial"/>
+                <a:sym typeface="Arial"/>
+              </a:rPr>
+              <a:t> A Fidesz még így sem üti meg az országos átlagát, talán ezek nem igazán fidesz-barát területek.</a:t>
+            </a:r>
+            <a:r>
+              <a:rPr lang="en-GB" sz="1500"/>
+              <a:t> A Jobbik nem jár jól.</a:t>
             </a:r>
             <a:br>
               <a:rPr lang="en-GB" sz="1300"/>
@@ -29179,7 +28976,7 @@
                 <a:cs typeface="Arial"/>
                 <a:sym typeface="Arial"/>
               </a:rPr>
-              <a:t> mintha egy plafonba ütközne: feltűnően ritkán kap egy érték fölött. (Bár ez mást is jelenthet.)</a:t>
+              <a:t> mintha egy plafonba ütközne: feltűnően ritkán kap egy érték fölött.</a:t>
             </a:r>
             <a:endParaRPr b="0" sz="1500" strike="noStrike">
               <a:latin typeface="Arial"/>
@@ -29242,7 +29039,7 @@
   <p:cSld>
     <p:spTree>
       <p:nvGrpSpPr>
-        <p:cNvPr id="424" name="Shape 424"/>
+        <p:cNvPr id="418" name="Shape 418"/>
         <p:cNvGrpSpPr/>
         <p:nvPr/>
       </p:nvGrpSpPr>
@@ -29256,7 +29053,7 @@
       </p:grpSpPr>
       <p:sp>
         <p:nvSpPr>
-          <p:cNvPr id="425" name="Google Shape;425;p49"/>
+          <p:cNvPr id="419" name="Google Shape;419;p49"/>
           <p:cNvSpPr txBox="1"/>
           <p:nvPr/>
         </p:nvSpPr>
@@ -29308,7 +29105,7 @@
       </p:sp>
       <p:sp>
         <p:nvSpPr>
-          <p:cNvPr id="426" name="Google Shape;426;p49"/>
+          <p:cNvPr id="420" name="Google Shape;420;p49"/>
           <p:cNvSpPr txBox="1"/>
           <p:nvPr/>
         </p:nvSpPr>
@@ -29512,7 +29309,7 @@
   <p:cSld>
     <p:spTree>
       <p:nvGrpSpPr>
-        <p:cNvPr id="430" name="Shape 430"/>
+        <p:cNvPr id="424" name="Shape 424"/>
         <p:cNvGrpSpPr/>
         <p:nvPr/>
       </p:nvGrpSpPr>
@@ -29526,7 +29323,7 @@
       </p:grpSpPr>
       <p:sp>
         <p:nvSpPr>
-          <p:cNvPr id="431" name="Google Shape;431;p50"/>
+          <p:cNvPr id="425" name="Google Shape;425;p50"/>
           <p:cNvSpPr txBox="1"/>
           <p:nvPr/>
         </p:nvSpPr>
@@ -29586,7 +29383,7 @@
       </p:sp>
       <p:sp>
         <p:nvSpPr>
-          <p:cNvPr id="432" name="Google Shape;432;p50"/>
+          <p:cNvPr id="426" name="Google Shape;426;p50"/>
           <p:cNvSpPr txBox="1"/>
           <p:nvPr/>
         </p:nvSpPr>
@@ -29874,7 +29671,7 @@
   <p:cSld>
     <p:spTree>
       <p:nvGrpSpPr>
-        <p:cNvPr id="436" name="Shape 436"/>
+        <p:cNvPr id="430" name="Shape 430"/>
         <p:cNvGrpSpPr/>
         <p:nvPr/>
       </p:nvGrpSpPr>
@@ -29888,7 +29685,7 @@
       </p:grpSpPr>
       <p:sp>
         <p:nvSpPr>
-          <p:cNvPr id="437" name="Google Shape;437;p51"/>
+          <p:cNvPr id="431" name="Google Shape;431;p51"/>
           <p:cNvSpPr txBox="1"/>
           <p:nvPr>
             <p:ph type="title"/>
@@ -29930,13 +29727,17 @@
               </a:rPr>
               <a:t>Kétséges, hogy volt-e ⅔ (2.)</a:t>
             </a:r>
-            <a:endParaRPr/>
+            <a:endParaRPr sz="4400">
+              <a:solidFill>
+                <a:schemeClr val="dk1"/>
+              </a:solidFill>
+            </a:endParaRPr>
           </a:p>
         </p:txBody>
       </p:sp>
       <p:sp>
         <p:nvSpPr>
-          <p:cNvPr id="438" name="Google Shape;438;p51"/>
+          <p:cNvPr id="432" name="Google Shape;432;p51"/>
           <p:cNvSpPr txBox="1"/>
           <p:nvPr>
             <p:ph idx="1" type="body"/>
@@ -30269,7 +30070,7 @@
   <p:cSld>
     <p:spTree>
       <p:nvGrpSpPr>
-        <p:cNvPr id="442" name="Shape 442"/>
+        <p:cNvPr id="436" name="Shape 436"/>
         <p:cNvGrpSpPr/>
         <p:nvPr/>
       </p:nvGrpSpPr>
@@ -30283,7 +30084,7 @@
       </p:grpSpPr>
       <p:sp>
         <p:nvSpPr>
-          <p:cNvPr id="443" name="Google Shape;443;p52"/>
+          <p:cNvPr id="437" name="Google Shape;437;p52"/>
           <p:cNvSpPr txBox="1"/>
           <p:nvPr/>
         </p:nvSpPr>
@@ -30335,7 +30136,7 @@
       </p:sp>
       <p:sp>
         <p:nvSpPr>
-          <p:cNvPr id="444" name="Google Shape;444;p52"/>
+          <p:cNvPr id="438" name="Google Shape;438;p52"/>
           <p:cNvSpPr txBox="1"/>
           <p:nvPr/>
         </p:nvSpPr>
@@ -30941,7 +30742,7 @@
   <p:cSld>
     <p:spTree>
       <p:nvGrpSpPr>
-        <p:cNvPr id="448" name="Shape 448"/>
+        <p:cNvPr id="442" name="Shape 442"/>
         <p:cNvGrpSpPr/>
         <p:nvPr/>
       </p:nvGrpSpPr>
@@ -30955,7 +30756,7 @@
       </p:grpSpPr>
       <p:sp>
         <p:nvSpPr>
-          <p:cNvPr id="449" name="Google Shape;449;p53"/>
+          <p:cNvPr id="443" name="Google Shape;443;p53"/>
           <p:cNvSpPr txBox="1"/>
           <p:nvPr/>
         </p:nvSpPr>
@@ -31007,7 +30808,7 @@
       </p:sp>
       <p:sp>
         <p:nvSpPr>
-          <p:cNvPr id="450" name="Google Shape;450;p53"/>
+          <p:cNvPr id="444" name="Google Shape;444;p53"/>
           <p:cNvSpPr txBox="1"/>
           <p:nvPr/>
         </p:nvSpPr>
@@ -31116,7 +30917,7 @@
   <p:cSld>
     <p:spTree>
       <p:nvGrpSpPr>
-        <p:cNvPr id="454" name="Shape 454"/>
+        <p:cNvPr id="448" name="Shape 448"/>
         <p:cNvGrpSpPr/>
         <p:nvPr/>
       </p:nvGrpSpPr>
@@ -31130,7 +30931,7 @@
       </p:grpSpPr>
       <p:sp>
         <p:nvSpPr>
-          <p:cNvPr id="455" name="Google Shape;455;p54"/>
+          <p:cNvPr id="449" name="Google Shape;449;p54"/>
           <p:cNvSpPr txBox="1"/>
           <p:nvPr/>
         </p:nvSpPr>
@@ -31182,7 +30983,7 @@
       </p:sp>
       <p:sp>
         <p:nvSpPr>
-          <p:cNvPr id="456" name="Google Shape;456;p54"/>
+          <p:cNvPr id="450" name="Google Shape;450;p54"/>
           <p:cNvSpPr txBox="1"/>
           <p:nvPr/>
         </p:nvSpPr>
@@ -31269,7 +31070,7 @@
       </p:sp>
       <p:sp>
         <p:nvSpPr>
-          <p:cNvPr id="457" name="Google Shape;457;p54"/>
+          <p:cNvPr id="451" name="Google Shape;451;p54"/>
           <p:cNvSpPr txBox="1"/>
           <p:nvPr/>
         </p:nvSpPr>
@@ -31332,7 +31133,7 @@
   <p:cSld>
     <p:spTree>
       <p:nvGrpSpPr>
-        <p:cNvPr id="461" name="Shape 461"/>
+        <p:cNvPr id="455" name="Shape 455"/>
         <p:cNvGrpSpPr/>
         <p:nvPr/>
       </p:nvGrpSpPr>
@@ -31346,7 +31147,7 @@
       </p:grpSpPr>
       <p:sp>
         <p:nvSpPr>
-          <p:cNvPr id="462" name="Google Shape;462;p55"/>
+          <p:cNvPr id="456" name="Google Shape;456;p55"/>
           <p:cNvSpPr txBox="1"/>
           <p:nvPr/>
         </p:nvSpPr>
@@ -31398,7 +31199,7 @@
       </p:sp>
       <p:sp>
         <p:nvSpPr>
-          <p:cNvPr id="463" name="Google Shape;463;p55"/>
+          <p:cNvPr id="457" name="Google Shape;457;p55"/>
           <p:cNvSpPr txBox="1"/>
           <p:nvPr/>
         </p:nvSpPr>
@@ -31630,7 +31431,7 @@
   <p:cSld>
     <p:spTree>
       <p:nvGrpSpPr>
-        <p:cNvPr id="467" name="Shape 467"/>
+        <p:cNvPr id="461" name="Shape 461"/>
         <p:cNvGrpSpPr/>
         <p:nvPr/>
       </p:nvGrpSpPr>
@@ -31644,7 +31445,7 @@
       </p:grpSpPr>
       <p:sp>
         <p:nvSpPr>
-          <p:cNvPr id="468" name="Google Shape;468;p56"/>
+          <p:cNvPr id="462" name="Google Shape;462;p56"/>
           <p:cNvSpPr txBox="1"/>
           <p:nvPr/>
         </p:nvSpPr>
@@ -31696,7 +31497,7 @@
       </p:sp>
       <p:sp>
         <p:nvSpPr>
-          <p:cNvPr id="469" name="Google Shape;469;p56"/>
+          <p:cNvPr id="463" name="Google Shape;463;p56"/>
           <p:cNvSpPr txBox="1"/>
           <p:nvPr/>
         </p:nvSpPr>
@@ -31861,7 +31662,7 @@
   <p:cSld>
     <p:spTree>
       <p:nvGrpSpPr>
-        <p:cNvPr id="473" name="Shape 473"/>
+        <p:cNvPr id="467" name="Shape 467"/>
         <p:cNvGrpSpPr/>
         <p:nvPr/>
       </p:nvGrpSpPr>
@@ -31875,7 +31676,7 @@
       </p:grpSpPr>
       <p:sp>
         <p:nvSpPr>
-          <p:cNvPr id="474" name="Google Shape;474;p57"/>
+          <p:cNvPr id="468" name="Google Shape;468;p57"/>
           <p:cNvSpPr txBox="1"/>
           <p:nvPr/>
         </p:nvSpPr>
@@ -31927,7 +31728,7 @@
       </p:sp>
       <p:sp>
         <p:nvSpPr>
-          <p:cNvPr id="475" name="Google Shape;475;p57"/>
+          <p:cNvPr id="469" name="Google Shape;469;p57"/>
           <p:cNvSpPr txBox="1"/>
           <p:nvPr/>
         </p:nvSpPr>
@@ -32121,7 +31922,7 @@
   <p:cSld>
     <p:spTree>
       <p:nvGrpSpPr>
-        <p:cNvPr id="479" name="Shape 479"/>
+        <p:cNvPr id="473" name="Shape 473"/>
         <p:cNvGrpSpPr/>
         <p:nvPr/>
       </p:nvGrpSpPr>
@@ -32135,7 +31936,7 @@
       </p:grpSpPr>
       <p:sp>
         <p:nvSpPr>
-          <p:cNvPr id="480" name="Google Shape;480;p58"/>
+          <p:cNvPr id="474" name="Google Shape;474;p58"/>
           <p:cNvSpPr txBox="1"/>
           <p:nvPr/>
         </p:nvSpPr>
@@ -32187,7 +31988,7 @@
       </p:sp>
       <p:sp>
         <p:nvSpPr>
-          <p:cNvPr id="481" name="Google Shape;481;p58"/>
+          <p:cNvPr id="475" name="Google Shape;475;p58"/>
           <p:cNvSpPr txBox="1"/>
           <p:nvPr/>
         </p:nvSpPr>
@@ -32345,7 +32146,7 @@
   <p:cSld>
     <p:spTree>
       <p:nvGrpSpPr>
-        <p:cNvPr id="485" name="Shape 485"/>
+        <p:cNvPr id="479" name="Shape 479"/>
         <p:cNvGrpSpPr/>
         <p:nvPr/>
       </p:nvGrpSpPr>
@@ -32359,7 +32160,7 @@
       </p:grpSpPr>
       <p:sp>
         <p:nvSpPr>
-          <p:cNvPr id="486" name="Google Shape;486;p59"/>
+          <p:cNvPr id="480" name="Google Shape;480;p59"/>
           <p:cNvSpPr txBox="1"/>
           <p:nvPr/>
         </p:nvSpPr>
@@ -32411,7 +32212,7 @@
       </p:sp>
       <p:sp>
         <p:nvSpPr>
-          <p:cNvPr id="487" name="Google Shape;487;p59"/>
+          <p:cNvPr id="481" name="Google Shape;481;p59"/>
           <p:cNvSpPr txBox="1"/>
           <p:nvPr/>
         </p:nvSpPr>
@@ -32559,7 +32360,7 @@
   <p:cSld>
     <p:spTree>
       <p:nvGrpSpPr>
-        <p:cNvPr id="491" name="Shape 491"/>
+        <p:cNvPr id="485" name="Shape 485"/>
         <p:cNvGrpSpPr/>
         <p:nvPr/>
       </p:nvGrpSpPr>
@@ -32573,7 +32374,7 @@
       </p:grpSpPr>
       <p:sp>
         <p:nvSpPr>
-          <p:cNvPr id="492" name="Google Shape;492;p60"/>
+          <p:cNvPr id="486" name="Google Shape;486;p60"/>
           <p:cNvSpPr txBox="1"/>
           <p:nvPr/>
         </p:nvSpPr>
@@ -32625,7 +32426,7 @@
       </p:sp>
       <p:sp>
         <p:nvSpPr>
-          <p:cNvPr id="493" name="Google Shape;493;p60"/>
+          <p:cNvPr id="487" name="Google Shape;487;p60"/>
           <p:cNvSpPr txBox="1"/>
           <p:nvPr/>
         </p:nvSpPr>
@@ -32779,7 +32580,7 @@
   <p:cSld>
     <p:spTree>
       <p:nvGrpSpPr>
-        <p:cNvPr id="497" name="Shape 497"/>
+        <p:cNvPr id="491" name="Shape 491"/>
         <p:cNvGrpSpPr/>
         <p:nvPr/>
       </p:nvGrpSpPr>
@@ -32793,7 +32594,7 @@
       </p:grpSpPr>
       <p:sp>
         <p:nvSpPr>
-          <p:cNvPr id="498" name="Google Shape;498;p61"/>
+          <p:cNvPr id="492" name="Google Shape;492;p61"/>
           <p:cNvSpPr txBox="1"/>
           <p:nvPr/>
         </p:nvSpPr>
@@ -32860,7 +32661,7 @@
       </p:sp>
       <p:sp>
         <p:nvSpPr>
-          <p:cNvPr id="499" name="Google Shape;499;p61"/>
+          <p:cNvPr id="493" name="Google Shape;493;p61"/>
           <p:cNvSpPr txBox="1"/>
           <p:nvPr/>
         </p:nvSpPr>
@@ -33031,7 +32832,7 @@
   <p:cSld>
     <p:spTree>
       <p:nvGrpSpPr>
-        <p:cNvPr id="503" name="Shape 503"/>
+        <p:cNvPr id="497" name="Shape 497"/>
         <p:cNvGrpSpPr/>
         <p:nvPr/>
       </p:nvGrpSpPr>
@@ -33045,7 +32846,7 @@
       </p:grpSpPr>
       <p:sp>
         <p:nvSpPr>
-          <p:cNvPr id="504" name="Google Shape;504;p62"/>
+          <p:cNvPr id="498" name="Google Shape;498;p62"/>
           <p:cNvSpPr txBox="1"/>
           <p:nvPr/>
         </p:nvSpPr>
@@ -33097,7 +32898,7 @@
       </p:sp>
       <p:sp>
         <p:nvSpPr>
-          <p:cNvPr id="505" name="Google Shape;505;p62"/>
+          <p:cNvPr id="499" name="Google Shape;499;p62"/>
           <p:cNvSpPr txBox="1"/>
           <p:nvPr/>
         </p:nvSpPr>
@@ -33174,7 +32975,7 @@
       </p:sp>
       <p:pic>
         <p:nvPicPr>
-          <p:cNvPr id="506" name="Google Shape;506;p62"/>
+          <p:cNvPr id="500" name="Google Shape;500;p62"/>
           <p:cNvPicPr preferRelativeResize="0"/>
           <p:nvPr/>
         </p:nvPicPr>
@@ -33201,7 +33002,7 @@
       </p:pic>
       <p:sp>
         <p:nvSpPr>
-          <p:cNvPr id="507" name="Google Shape;507;p62"/>
+          <p:cNvPr id="501" name="Google Shape;501;p62"/>
           <p:cNvSpPr txBox="1"/>
           <p:nvPr/>
         </p:nvSpPr>
@@ -33655,7 +33456,7 @@
             </a:r>
             <a:r>
               <a:rPr lang="en-GB" sz="2400"/>
-              <a:t>100-200-ezer Fidesz </a:t>
+              <a:t>150-220-ezer Fidesz </a:t>
             </a:r>
             <a:r>
               <a:rPr b="0" lang="en-GB" sz="2400" strike="noStrike">
@@ -33664,33 +33465,7 @@
                 <a:cs typeface="Arial"/>
                 <a:sym typeface="Arial"/>
               </a:rPr>
-              <a:t>szavazat manipulációnak egyértelműen </a:t>
-            </a:r>
-            <a:endParaRPr b="0" sz="2400" strike="noStrike">
-              <a:latin typeface="Arial"/>
-              <a:ea typeface="Arial"/>
-              <a:cs typeface="Arial"/>
-              <a:sym typeface="Arial"/>
-            </a:endParaRPr>
-          </a:p>
-          <a:p>
-            <a:pPr indent="0" lvl="0" marL="457200" marR="0" rtl="0" algn="l">
-              <a:spcBef>
-                <a:spcPts val="0"/>
-              </a:spcBef>
-              <a:spcAft>
-                <a:spcPts val="0"/>
-              </a:spcAft>
-              <a:buNone/>
-            </a:pPr>
-            <a:r>
-              <a:rPr b="0" lang="en-GB" sz="2400" strike="noStrike">
-                <a:latin typeface="Arial"/>
-                <a:ea typeface="Arial"/>
-                <a:cs typeface="Arial"/>
-                <a:sym typeface="Arial"/>
-              </a:rPr>
-              <a:t>legalábbis a nagyon erős gyanúját veti fel</a:t>
+              <a:t>szavazat manipulációnak egyértelműen legalábbis a nagyon erős gyanúját veti fel</a:t>
             </a:r>
             <a:br>
               <a:rPr b="0" lang="en-GB" sz="2400" strike="noStrike">
@@ -33792,7 +33567,7 @@
   <p:cSld>
     <p:spTree>
       <p:nvGrpSpPr>
-        <p:cNvPr id="511" name="Shape 511"/>
+        <p:cNvPr id="505" name="Shape 505"/>
         <p:cNvGrpSpPr/>
         <p:nvPr/>
       </p:nvGrpSpPr>
@@ -33806,7 +33581,7 @@
       </p:grpSpPr>
       <p:sp>
         <p:nvSpPr>
-          <p:cNvPr id="512" name="Google Shape;512;p63"/>
+          <p:cNvPr id="506" name="Google Shape;506;p63"/>
           <p:cNvSpPr txBox="1"/>
           <p:nvPr/>
         </p:nvSpPr>
@@ -33852,7 +33627,7 @@
       </p:sp>
       <p:sp>
         <p:nvSpPr>
-          <p:cNvPr id="513" name="Google Shape;513;p63"/>
+          <p:cNvPr id="507" name="Google Shape;507;p63"/>
           <p:cNvSpPr txBox="1"/>
           <p:nvPr/>
         </p:nvSpPr>
@@ -33966,7 +33741,7 @@
   <p:cSld>
     <p:spTree>
       <p:nvGrpSpPr>
-        <p:cNvPr id="517" name="Shape 517"/>
+        <p:cNvPr id="511" name="Shape 511"/>
         <p:cNvGrpSpPr/>
         <p:nvPr/>
       </p:nvGrpSpPr>
@@ -33980,7 +33755,7 @@
       </p:grpSpPr>
       <p:sp>
         <p:nvSpPr>
-          <p:cNvPr id="518" name="Google Shape;518;p64"/>
+          <p:cNvPr id="512" name="Google Shape;512;p64"/>
           <p:cNvSpPr txBox="1"/>
           <p:nvPr/>
         </p:nvSpPr>
@@ -34032,7 +33807,7 @@
       </p:sp>
       <p:sp>
         <p:nvSpPr>
-          <p:cNvPr id="519" name="Google Shape;519;p64"/>
+          <p:cNvPr id="513" name="Google Shape;513;p64"/>
           <p:cNvSpPr txBox="1"/>
           <p:nvPr/>
         </p:nvSpPr>
@@ -34244,7 +34019,7 @@
   <p:cSld>
     <p:spTree>
       <p:nvGrpSpPr>
-        <p:cNvPr id="523" name="Shape 523"/>
+        <p:cNvPr id="517" name="Shape 517"/>
         <p:cNvGrpSpPr/>
         <p:nvPr/>
       </p:nvGrpSpPr>
@@ -34258,7 +34033,7 @@
       </p:grpSpPr>
       <p:sp>
         <p:nvSpPr>
-          <p:cNvPr id="524" name="Google Shape;524;p65"/>
+          <p:cNvPr id="518" name="Google Shape;518;p65"/>
           <p:cNvSpPr txBox="1"/>
           <p:nvPr/>
         </p:nvSpPr>
@@ -34322,7 +34097,7 @@
                   <a:schemeClr val="dk1"/>
                 </a:solidFill>
               </a:rPr>
-              <a:t>  vagy </a:t>
+              <a:t> vagy a </a:t>
             </a:r>
             <a:r>
               <a:rPr lang="en-GB" u="sng">
@@ -34680,7 +34455,7 @@
       </p:sp>
       <p:sp>
         <p:nvSpPr>
-          <p:cNvPr id="525" name="Google Shape;525;p65"/>
+          <p:cNvPr id="519" name="Google Shape;519;p65"/>
           <p:cNvSpPr txBox="1"/>
           <p:nvPr/>
         </p:nvSpPr>
@@ -34921,7 +34696,12 @@
               <a:buNone/>
             </a:pPr>
             <a:r>
-              <a:t/>
+              <a:rPr lang="en-GB" sz="2500">
+                <a:solidFill>
+                  <a:schemeClr val="dk1"/>
+                </a:solidFill>
+              </a:rPr>
+              <a:t>Ehhez mindössze az utolsó számjegyek lettek megvizsgálva</a:t>
             </a:r>
             <a:endParaRPr sz="2500">
               <a:solidFill>
@@ -34945,31 +34725,7 @@
                   <a:schemeClr val="dk1"/>
                 </a:solidFill>
               </a:rPr>
-              <a:t>Ehhez mindössze az utolsó számjegyek lettek megvizsgálva</a:t>
-            </a:r>
-            <a:endParaRPr sz="2500">
-              <a:solidFill>
-                <a:schemeClr val="dk1"/>
-              </a:solidFill>
-            </a:endParaRPr>
-          </a:p>
-          <a:p>
-            <a:pPr indent="0" lvl="0" marL="457200" rtl="0" algn="l">
-              <a:spcBef>
-                <a:spcPts val="1417"/>
-              </a:spcBef>
-              <a:spcAft>
-                <a:spcPts val="0"/>
-              </a:spcAft>
-              <a:buNone/>
-            </a:pPr>
-            <a:r>
-              <a:rPr lang="en-GB" sz="2500">
-                <a:solidFill>
-                  <a:schemeClr val="dk1"/>
-                </a:solidFill>
-              </a:rPr>
-              <a:t>Az összesített lista gyanúsabb (kb. fele-fele) és kevésbé gyanús körzeteinek eredménye ábrázolásra került “választási statisztikai ujjlenyomat” diagramon</a:t>
+              <a:t>Az összesített lista gyanúsabb (kb. fele-fele) és kevésbé gyanús körzeteinek eredménye ábrázolásra került “választási statisztikai ujjlenyomat” diagramon (példa talá</a:t>
             </a:r>
             <a:endParaRPr sz="2500">
               <a:solidFill>
@@ -35402,7 +35158,7 @@
             <a:tbl>
               <a:tblPr>
                 <a:noFill/>
-                <a:tableStyleId>{75D120C3-5C53-4029-85D3-79420072BE69}</a:tableStyleId>
+                <a:tableStyleId>{235616EC-FFBD-48CE-9284-A92EFDE56151}</a:tableStyleId>
               </a:tblPr>
               <a:tblGrid>
                 <a:gridCol w="498150"/>
@@ -41045,7 +40801,7 @@
             <a:tbl>
               <a:tblPr>
                 <a:noFill/>
-                <a:tableStyleId>{75D120C3-5C53-4029-85D3-79420072BE69}</a:tableStyleId>
+                <a:tableStyleId>{235616EC-FFBD-48CE-9284-A92EFDE56151}</a:tableStyleId>
               </a:tblPr>
               <a:tblGrid>
                 <a:gridCol w="518400"/>

</xml_diff>